<commit_message>
Provide improved templates with example screenshots
</commit_message>
<xml_diff>
--- a/_extensions/jgi/reference-doc.pptx
+++ b/_extensions/jgi/reference-doc.pptx
@@ -1897,7 +1897,7 @@
           <a:p>
             <a:pPr lvl="0"/>
             <a:r>
-              <a:rPr lang="en-US"/>
+              <a:rPr lang="en-US" dirty="0"/>
               <a:t>Click to edit Master text styles</a:t>
             </a:r>
           </a:p>
@@ -1953,35 +1953,35 @@
           <a:p>
             <a:pPr lvl="0"/>
             <a:r>
-              <a:rPr lang="en-US"/>
+              <a:rPr lang="en-US" dirty="0"/>
               <a:t>Click to edit Master text styles</a:t>
             </a:r>
           </a:p>
           <a:p>
             <a:pPr lvl="1"/>
             <a:r>
-              <a:rPr lang="en-US"/>
+              <a:rPr lang="en-US" dirty="0"/>
               <a:t>Second level</a:t>
             </a:r>
           </a:p>
           <a:p>
             <a:pPr lvl="2"/>
             <a:r>
-              <a:rPr lang="en-US"/>
+              <a:rPr lang="en-US" dirty="0"/>
               <a:t>Third level</a:t>
             </a:r>
           </a:p>
           <a:p>
             <a:pPr lvl="3"/>
             <a:r>
-              <a:rPr lang="en-US"/>
+              <a:rPr lang="en-US" dirty="0"/>
               <a:t>Fourth level</a:t>
             </a:r>
           </a:p>
           <a:p>
             <a:pPr lvl="4"/>
             <a:r>
-              <a:rPr lang="en-US"/>
+              <a:rPr lang="en-US" dirty="0"/>
               <a:t>Fifth level</a:t>
             </a:r>
           </a:p>
@@ -2516,7 +2516,7 @@
           <a:lstStyle>
             <a:lvl1pPr marL="0" indent="0">
               <a:buNone/>
-              <a:defRPr sz="2400"/>
+              <a:defRPr sz="1800"/>
             </a:lvl1pPr>
             <a:lvl2pPr marL="342900" indent="0">
               <a:buNone/>
@@ -2814,35 +2814,35 @@
           <a:p>
             <a:pPr lvl="0"/>
             <a:r>
-              <a:rPr lang="en-US"/>
+              <a:rPr lang="en-US" dirty="0"/>
               <a:t>Click to edit Master text styles</a:t>
             </a:r>
           </a:p>
           <a:p>
             <a:pPr lvl="1"/>
             <a:r>
-              <a:rPr lang="en-US"/>
+              <a:rPr lang="en-US" dirty="0"/>
               <a:t>Second level</a:t>
             </a:r>
           </a:p>
           <a:p>
             <a:pPr lvl="2"/>
             <a:r>
-              <a:rPr lang="en-US"/>
+              <a:rPr lang="en-US" dirty="0"/>
               <a:t>Third level</a:t>
             </a:r>
           </a:p>
           <a:p>
             <a:pPr lvl="3"/>
             <a:r>
-              <a:rPr lang="en-US"/>
+              <a:rPr lang="en-US" dirty="0"/>
               <a:t>Fourth level</a:t>
             </a:r>
           </a:p>
           <a:p>
             <a:pPr lvl="4"/>
             <a:r>
-              <a:rPr lang="en-US"/>
+              <a:rPr lang="en-US" dirty="0"/>
               <a:t>Fifth level</a:t>
             </a:r>
           </a:p>
@@ -2868,7 +2868,9 @@
           </a:prstGeom>
         </p:spPr>
         <p:txBody>
-          <a:bodyPr vert="horz" lIns="91440" tIns="45720" rIns="91440" bIns="45720" rtlCol="0" anchor="ctr"/>
+          <a:bodyPr vert="horz" lIns="91440" tIns="45720" rIns="91440" bIns="45720" rtlCol="0" anchor="ctr">
+            <a:normAutofit/>
+          </a:bodyPr>
           <a:lstStyle>
             <a:lvl1pPr algn="l">
               <a:defRPr sz="900">
@@ -2909,7 +2911,9 @@
           </a:prstGeom>
         </p:spPr>
         <p:txBody>
-          <a:bodyPr vert="horz" lIns="91440" tIns="45720" rIns="91440" bIns="45720" rtlCol="0" anchor="ctr"/>
+          <a:bodyPr vert="horz" lIns="91440" tIns="45720" rIns="91440" bIns="45720" rtlCol="0" anchor="ctr">
+            <a:normAutofit/>
+          </a:bodyPr>
           <a:lstStyle>
             <a:lvl1pPr algn="ctr">
               <a:defRPr sz="900">
@@ -2922,7 +2926,7 @@
             </a:lvl1pPr>
           </a:lstStyle>
           <a:p>
-            <a:endParaRPr lang="en-US"/>
+            <a:endParaRPr lang="en-US" dirty="0"/>
           </a:p>
         </p:txBody>
       </p:sp>
@@ -2946,7 +2950,9 @@
           </a:prstGeom>
         </p:spPr>
         <p:txBody>
-          <a:bodyPr vert="horz" lIns="91440" tIns="45720" rIns="91440" bIns="45720" rtlCol="0" anchor="ctr"/>
+          <a:bodyPr vert="horz" lIns="91440" tIns="45720" rIns="91440" bIns="45720" rtlCol="0" anchor="ctr">
+            <a:normAutofit/>
+          </a:bodyPr>
           <a:lstStyle>
             <a:lvl1pPr algn="r">
               <a:defRPr sz="900">

</xml_diff>

<commit_message>
Attempt to fix broken pptx template
</commit_message>
<xml_diff>
--- a/_extensions/jgi/reference-doc.pptx
+++ b/_extensions/jgi/reference-doc.pptx
@@ -5,10 +5,13 @@
     <p:sldMasterId id="2147483648" r:id="rId1"/>
   </p:sldMasterIdLst>
   <p:notesMasterIdLst>
-    <p:notesMasterId r:id="rId3"/>
+    <p:notesMasterId r:id="rId6"/>
   </p:notesMasterIdLst>
   <p:sldIdLst>
     <p:sldId id="256" r:id="rId2"/>
+    <p:sldId id="257" r:id="rId3"/>
+    <p:sldId id="258" r:id="rId4"/>
+    <p:sldId id="259" r:id="rId5"/>
   </p:sldIdLst>
   <p:sldSz cx="9144000" cy="5143500" type="screen16x9"/>
   <p:notesSz cx="6858000" cy="9144000"/>
@@ -208,7 +211,7 @@
           <a:p>
             <a:fld id="{0F9C1CCF-B725-44A7-AA57-5E433BD85C9F}" type="datetimeFigureOut">
               <a:rPr lang="en-US" smtClean="0"/>
-              <a:t>6/27/2024</a:t>
+              <a:t>7/1/2024</a:t>
             </a:fld>
             <a:endParaRPr lang="en-US"/>
           </a:p>
@@ -475,6 +478,213 @@
 </p:notesMaster>
 </file>
 
+<file path=ppt/notesSlides/notesSlide1.xml><?xml version="1.0" encoding="utf-8"?>
+<p:notes xmlns:a="http://schemas.openxmlformats.org/drawingml/2006/main" xmlns:r="http://schemas.openxmlformats.org/officeDocument/2006/relationships" xmlns:p="http://schemas.openxmlformats.org/presentationml/2006/main">
+  <p:cSld>
+    <p:spTree>
+      <p:nvGrpSpPr>
+        <p:cNvPr id="1" name=""/>
+        <p:cNvGrpSpPr/>
+        <p:nvPr/>
+      </p:nvGrpSpPr>
+      <p:grpSpPr>
+        <a:xfrm>
+          <a:off x="0" y="0"/>
+          <a:ext cx="0" cy="0"/>
+          <a:chOff x="0" y="0"/>
+          <a:chExt cx="0" cy="0"/>
+        </a:xfrm>
+      </p:grpSpPr>
+      <p:sp>
+        <p:nvSpPr>
+          <p:cNvPr id="2" name="Slide Image Placeholder 1"/>
+          <p:cNvSpPr>
+            <a:spLocks noGrp="1" noRot="1" noChangeAspect="1"/>
+          </p:cNvSpPr>
+          <p:nvPr>
+            <p:ph type="sldImg"/>
+          </p:nvPr>
+        </p:nvSpPr>
+        <p:spPr>
+          <a:xfrm>
+            <a:off x="685800" y="1143000"/>
+            <a:ext cx="5486400" cy="3086100"/>
+          </a:xfrm>
+        </p:spPr>
+      </p:sp>
+      <p:sp>
+        <p:nvSpPr>
+          <p:cNvPr id="3" name="Notes Placeholder 2"/>
+          <p:cNvSpPr>
+            <a:spLocks noGrp="1"/>
+          </p:cNvSpPr>
+          <p:nvPr>
+            <p:ph type="body" idx="1"/>
+          </p:nvPr>
+        </p:nvSpPr>
+        <p:spPr/>
+        <p:txBody>
+          <a:bodyPr/>
+          <a:lstStyle/>
+          <a:p>
+            <a:r>
+              <a:rPr lang="en-US" dirty="0"/>
+              <a:t>Here</a:t>
+            </a:r>
+            <a:r>
+              <a:rPr lang="en-US" baseline="0" dirty="0"/>
+              <a:t> is a note</a:t>
+            </a:r>
+          </a:p>
+          <a:p>
+            <a:endParaRPr lang="en-US" baseline="0" dirty="0"/>
+          </a:p>
+          <a:p>
+            <a:r>
+              <a:rPr lang="en-US" baseline="0" dirty="0"/>
+              <a:t>With another paragraph.</a:t>
+            </a:r>
+            <a:endParaRPr lang="en-US" dirty="0"/>
+          </a:p>
+        </p:txBody>
+      </p:sp>
+      <p:sp>
+        <p:nvSpPr>
+          <p:cNvPr id="4" name="Slide Number Placeholder 3"/>
+          <p:cNvSpPr>
+            <a:spLocks noGrp="1"/>
+          </p:cNvSpPr>
+          <p:nvPr>
+            <p:ph type="sldNum" sz="quarter" idx="10"/>
+          </p:nvPr>
+        </p:nvSpPr>
+        <p:spPr/>
+        <p:txBody>
+          <a:bodyPr/>
+          <a:lstStyle/>
+          <a:p>
+            <a:fld id="{18BDFEC3-8487-43E8-A154-7C12CBC1FFF2}" type="slidenum">
+              <a:rPr lang="en-US" smtClean="0"/>
+              <a:t>1</a:t>
+            </a:fld>
+            <a:endParaRPr lang="en-US"/>
+          </a:p>
+        </p:txBody>
+      </p:sp>
+    </p:spTree>
+    <p:extLst>
+      <p:ext uri="{BB962C8B-B14F-4D97-AF65-F5344CB8AC3E}">
+        <p14:creationId xmlns:p14="http://schemas.microsoft.com/office/powerpoint/2010/main" val="3171319170"/>
+      </p:ext>
+    </p:extLst>
+  </p:cSld>
+  <p:clrMapOvr>
+    <a:masterClrMapping/>
+  </p:clrMapOvr>
+</p:notes>
+</file>
+
+<file path=ppt/notesSlides/notesSlide2.xml><?xml version="1.0" encoding="utf-8"?>
+<p:notes xmlns:a="http://schemas.openxmlformats.org/drawingml/2006/main" xmlns:r="http://schemas.openxmlformats.org/officeDocument/2006/relationships" xmlns:p="http://schemas.openxmlformats.org/presentationml/2006/main">
+  <p:cSld>
+    <p:spTree>
+      <p:nvGrpSpPr>
+        <p:cNvPr id="1" name=""/>
+        <p:cNvGrpSpPr/>
+        <p:nvPr/>
+      </p:nvGrpSpPr>
+      <p:grpSpPr>
+        <a:xfrm>
+          <a:off x="0" y="0"/>
+          <a:ext cx="0" cy="0"/>
+          <a:chOff x="0" y="0"/>
+          <a:chExt cx="0" cy="0"/>
+        </a:xfrm>
+      </p:grpSpPr>
+      <p:sp>
+        <p:nvSpPr>
+          <p:cNvPr id="2" name="Slide Image Placeholder 1"/>
+          <p:cNvSpPr>
+            <a:spLocks noGrp="1" noRot="1" noChangeAspect="1"/>
+          </p:cNvSpPr>
+          <p:nvPr>
+            <p:ph type="sldImg"/>
+          </p:nvPr>
+        </p:nvSpPr>
+        <p:spPr>
+          <a:xfrm>
+            <a:off x="685800" y="1143000"/>
+            <a:ext cx="5486400" cy="3086100"/>
+          </a:xfrm>
+        </p:spPr>
+      </p:sp>
+      <p:sp>
+        <p:nvSpPr>
+          <p:cNvPr id="3" name="Notes Placeholder 2"/>
+          <p:cNvSpPr>
+            <a:spLocks noGrp="1"/>
+          </p:cNvSpPr>
+          <p:nvPr>
+            <p:ph type="body" idx="1"/>
+          </p:nvPr>
+        </p:nvSpPr>
+        <p:spPr/>
+        <p:txBody>
+          <a:bodyPr/>
+          <a:lstStyle/>
+          <a:p>
+            <a:r>
+              <a:rPr lang="en-US" dirty="0"/>
+              <a:t>A</a:t>
+            </a:r>
+            <a:r>
+              <a:rPr lang="en-US" baseline="0" dirty="0"/>
+              <a:t> speaker note on </a:t>
+            </a:r>
+            <a:r>
+              <a:rPr lang="en-US" baseline="0"/>
+              <a:t>this slide too.</a:t>
+            </a:r>
+            <a:endParaRPr lang="en-US"/>
+          </a:p>
+        </p:txBody>
+      </p:sp>
+      <p:sp>
+        <p:nvSpPr>
+          <p:cNvPr id="4" name="Slide Number Placeholder 3"/>
+          <p:cNvSpPr>
+            <a:spLocks noGrp="1"/>
+          </p:cNvSpPr>
+          <p:nvPr>
+            <p:ph type="sldNum" sz="quarter" idx="10"/>
+          </p:nvPr>
+        </p:nvSpPr>
+        <p:spPr/>
+        <p:txBody>
+          <a:bodyPr/>
+          <a:lstStyle/>
+          <a:p>
+            <a:fld id="{18BDFEC3-8487-43E8-A154-7C12CBC1FFF2}" type="slidenum">
+              <a:rPr lang="en-US" smtClean="0"/>
+              <a:t>2</a:t>
+            </a:fld>
+            <a:endParaRPr lang="en-US"/>
+          </a:p>
+        </p:txBody>
+      </p:sp>
+    </p:spTree>
+    <p:extLst>
+      <p:ext uri="{BB962C8B-B14F-4D97-AF65-F5344CB8AC3E}">
+        <p14:creationId xmlns:p14="http://schemas.microsoft.com/office/powerpoint/2010/main" val="3016900036"/>
+      </p:ext>
+    </p:extLst>
+  </p:cSld>
+  <p:clrMapOvr>
+    <a:masterClrMapping/>
+  </p:clrMapOvr>
+</p:notes>
+</file>
+
 <file path=ppt/slideLayouts/slideLayout1.xml><?xml version="1.0" encoding="utf-8"?>
 <p:sldLayout xmlns:a="http://schemas.openxmlformats.org/drawingml/2006/main" xmlns:r="http://schemas.openxmlformats.org/officeDocument/2006/relationships" xmlns:p="http://schemas.openxmlformats.org/presentationml/2006/main" type="title" preserve="1">
   <p:cSld name="Title Slide">
@@ -508,10 +718,10 @@
       </p:grpSpPr>
       <p:sp>
         <p:nvSpPr>
-          <p:cNvPr id="8" name="Freeform 8">
+          <p:cNvPr id="9" name="Freeform 8">
             <a:extLst>
               <a:ext uri="{FF2B5EF4-FFF2-40B4-BE49-F238E27FC236}">
-                <a16:creationId xmlns:a16="http://schemas.microsoft.com/office/drawing/2014/main" id="{419975F1-67EA-7EBC-C411-187EF4785D62}"/>
+                <a16:creationId xmlns:a16="http://schemas.microsoft.com/office/drawing/2014/main" id="{DC59E100-F6DB-7828-499C-2DCE39B1D1B0}"/>
               </a:ext>
               <a:ext uri="{C183D7F6-B498-43B3-948B-1728B52AA6E4}">
                 <adec:decorative xmlns:adec="http://schemas.microsoft.com/office/drawing/2017/decorative" val="1"/>
@@ -612,29 +822,68 @@
           </a:p>
         </p:txBody>
       </p:sp>
-      <p:sp>
-        <p:nvSpPr>
-          <p:cNvPr id="2" name="Title 1"/>
-          <p:cNvSpPr>
-            <a:spLocks noGrp="1"/>
-          </p:cNvSpPr>
-          <p:nvPr>
-            <p:ph type="ctrTitle"/>
-          </p:nvPr>
-        </p:nvSpPr>
+      <p:pic>
+        <p:nvPicPr>
+          <p:cNvPr id="10" name="Graphic 9" descr="Jean Golding Institute, University of Bristol">
+            <a:extLst>
+              <a:ext uri="{FF2B5EF4-FFF2-40B4-BE49-F238E27FC236}">
+                <a16:creationId xmlns:a16="http://schemas.microsoft.com/office/drawing/2014/main" id="{D49A7196-5BBC-0ECE-4A3A-E3ACC89BE301}"/>
+              </a:ext>
+              <a:ext uri="{C183D7F6-B498-43B3-948B-1728B52AA6E4}">
+                <adec:decorative xmlns:adec="http://schemas.microsoft.com/office/drawing/2017/decorative" val="0"/>
+              </a:ext>
+            </a:extLst>
+          </p:cNvPr>
+          <p:cNvPicPr>
+            <a:picLocks noChangeAspect="1"/>
+          </p:cNvPicPr>
+          <p:nvPr userDrawn="1"/>
+        </p:nvPicPr>
+        <p:blipFill>
+          <a:blip r:embed="rId3" cstate="screen">
+            <a:extLst>
+              <a:ext uri="{28A0092B-C50C-407E-A947-70E740481C1C}">
+                <a14:useLocalDpi xmlns:a14="http://schemas.microsoft.com/office/drawing/2010/main"/>
+              </a:ext>
+              <a:ext uri="{96DAC541-7B7A-43D3-8B79-37D633B846F1}">
+                <asvg:svgBlip xmlns:asvg="http://schemas.microsoft.com/office/drawing/2016/SVG/main" r:embed="rId4"/>
+              </a:ext>
+            </a:extLst>
+          </a:blip>
+          <a:srcRect/>
+          <a:stretch/>
+        </p:blipFill>
         <p:spPr>
           <a:xfrm>
-            <a:off x="232200" y="1209601"/>
-            <a:ext cx="4548600" cy="1461600"/>
+            <a:off x="7150814" y="345383"/>
+            <a:ext cx="1567524" cy="648332"/>
+          </a:xfrm>
+          <a:prstGeom prst="rect">
+            <a:avLst/>
+          </a:prstGeom>
+        </p:spPr>
+      </p:pic>
+      <p:sp>
+        <p:nvSpPr>
+          <p:cNvPr id="2" name="Title 1"/>
+          <p:cNvSpPr>
+            <a:spLocks noGrp="1"/>
+          </p:cNvSpPr>
+          <p:nvPr>
+            <p:ph type="ctrTitle"/>
+          </p:nvPr>
+        </p:nvSpPr>
+        <p:spPr>
+          <a:xfrm>
+            <a:off x="201600" y="1203265"/>
+            <a:ext cx="4675200" cy="1239897"/>
           </a:xfrm>
         </p:spPr>
         <p:txBody>
-          <a:bodyPr>
-            <a:normAutofit/>
-          </a:bodyPr>
+          <a:bodyPr anchor="ctr"/>
           <a:lstStyle>
             <a:lvl1pPr algn="l">
-              <a:defRPr sz="3200">
+              <a:defRPr>
                 <a:solidFill>
                   <a:schemeClr val="accent6"/>
                 </a:solidFill>
@@ -661,18 +910,16 @@
         </p:nvSpPr>
         <p:spPr>
           <a:xfrm>
-            <a:off x="232200" y="2671200"/>
-            <a:ext cx="4296600" cy="770400"/>
+            <a:off x="201600" y="2464862"/>
+            <a:ext cx="4476726" cy="693211"/>
           </a:xfrm>
         </p:spPr>
         <p:txBody>
-          <a:bodyPr anchor="ctr">
-            <a:normAutofit/>
-          </a:bodyPr>
+          <a:bodyPr anchor="ctr"/>
           <a:lstStyle>
             <a:lvl1pPr marL="0" indent="0" algn="l">
               <a:buNone/>
-              <a:defRPr sz="2000">
+              <a:defRPr sz="1600">
                 <a:solidFill>
                   <a:schemeClr val="accent1"/>
                 </a:solidFill>
@@ -767,47 +1014,43 @@
           </a:p>
         </p:txBody>
       </p:sp>
-      <p:pic>
-        <p:nvPicPr>
-          <p:cNvPr id="7" name="Graphic 6" descr="Jean Golding Institute, University of Bristol">
-            <a:extLst>
-              <a:ext uri="{FF2B5EF4-FFF2-40B4-BE49-F238E27FC236}">
-                <a16:creationId xmlns:a16="http://schemas.microsoft.com/office/drawing/2014/main" id="{2CDC0747-D152-7872-BCD9-80A7AB729145}"/>
-              </a:ext>
-              <a:ext uri="{C183D7F6-B498-43B3-948B-1728B52AA6E4}">
-                <adec:decorative xmlns:adec="http://schemas.microsoft.com/office/drawing/2017/decorative" val="0"/>
-              </a:ext>
-            </a:extLst>
-          </p:cNvPr>
-          <p:cNvPicPr>
-            <a:picLocks noChangeAspect="1"/>
-          </p:cNvPicPr>
-          <p:nvPr userDrawn="1"/>
-        </p:nvPicPr>
-        <p:blipFill>
-          <a:blip r:embed="rId3" cstate="screen">
-            <a:extLst>
-              <a:ext uri="{28A0092B-C50C-407E-A947-70E740481C1C}">
-                <a14:useLocalDpi xmlns:a14="http://schemas.microsoft.com/office/drawing/2010/main"/>
-              </a:ext>
-              <a:ext uri="{96DAC541-7B7A-43D3-8B79-37D633B846F1}">
-                <asvg:svgBlip xmlns:asvg="http://schemas.microsoft.com/office/drawing/2016/SVG/main" r:embed="rId4"/>
-              </a:ext>
-            </a:extLst>
-          </a:blip>
-          <a:srcRect/>
-          <a:stretch/>
-        </p:blipFill>
+      <p:sp>
+        <p:nvSpPr>
+          <p:cNvPr id="4" name="Date Placeholder 3"/>
+          <p:cNvSpPr>
+            <a:spLocks noGrp="1"/>
+          </p:cNvSpPr>
+          <p:nvPr>
+            <p:ph type="dt" sz="half" idx="10"/>
+          </p:nvPr>
+        </p:nvSpPr>
         <p:spPr>
           <a:xfrm>
-            <a:off x="7150814" y="345383"/>
-            <a:ext cx="1567524" cy="648332"/>
+            <a:off x="201599" y="3179773"/>
+            <a:ext cx="4370399" cy="209550"/>
           </a:xfrm>
-          <a:prstGeom prst="rect">
-            <a:avLst/>
-          </a:prstGeom>
         </p:spPr>
-      </p:pic>
+        <p:txBody>
+          <a:bodyPr/>
+          <a:lstStyle>
+            <a:lvl1pPr>
+              <a:defRPr sz="1600">
+                <a:solidFill>
+                  <a:schemeClr val="accent1"/>
+                </a:solidFill>
+              </a:defRPr>
+            </a:lvl1pPr>
+          </a:lstStyle>
+          <a:p>
+            <a:fld id="{241EB5C9-1307-BA42-ABA2-0BC069CD8E7F}" type="datetimeFigureOut">
+              <a:rPr lang="en-US" smtClean="0"/>
+              <a:pPr/>
+              <a:t>7/1/2024</a:t>
+            </a:fld>
+            <a:endParaRPr lang="en-US" dirty="0"/>
+          </a:p>
+        </p:txBody>
+      </p:sp>
     </p:spTree>
     <p:extLst>
       <p:ext uri="{BB962C8B-B14F-4D97-AF65-F5344CB8AC3E}">
@@ -822,87 +1065,6 @@
 </file>
 
 <file path=ppt/slideLayouts/slideLayout2.xml><?xml version="1.0" encoding="utf-8"?>
-<p:sldLayout xmlns:a="http://schemas.openxmlformats.org/drawingml/2006/main" xmlns:r="http://schemas.openxmlformats.org/officeDocument/2006/relationships" xmlns:p="http://schemas.openxmlformats.org/presentationml/2006/main" preserve="1" userDrawn="1">
-  <p:cSld name="Section Header">
-    <p:bg>
-      <p:bgPr>
-        <a:blipFill dpi="0" rotWithShape="1">
-          <a:blip r:embed="rId2">
-            <a:lum/>
-          </a:blip>
-          <a:srcRect/>
-          <a:stretch>
-            <a:fillRect/>
-          </a:stretch>
-        </a:blipFill>
-        <a:effectLst/>
-      </p:bgPr>
-    </p:bg>
-    <p:spTree>
-      <p:nvGrpSpPr>
-        <p:cNvPr id="1" name=""/>
-        <p:cNvGrpSpPr/>
-        <p:nvPr/>
-      </p:nvGrpSpPr>
-      <p:grpSpPr>
-        <a:xfrm>
-          <a:off x="0" y="0"/>
-          <a:ext cx="0" cy="0"/>
-          <a:chOff x="0" y="0"/>
-          <a:chExt cx="0" cy="0"/>
-        </a:xfrm>
-      </p:grpSpPr>
-      <p:sp>
-        <p:nvSpPr>
-          <p:cNvPr id="2" name="Title 1"/>
-          <p:cNvSpPr>
-            <a:spLocks noGrp="1"/>
-          </p:cNvSpPr>
-          <p:nvPr>
-            <p:ph type="title"/>
-          </p:nvPr>
-        </p:nvSpPr>
-        <p:spPr>
-          <a:xfrm>
-            <a:off x="232200" y="1488453"/>
-            <a:ext cx="4903070" cy="2166594"/>
-          </a:xfrm>
-        </p:spPr>
-        <p:txBody>
-          <a:bodyPr anchor="ctr">
-            <a:normAutofit/>
-          </a:bodyPr>
-          <a:lstStyle>
-            <a:lvl1pPr algn="l">
-              <a:defRPr sz="3200" b="0" cap="none" baseline="0">
-                <a:solidFill>
-                  <a:schemeClr val="bg1"/>
-                </a:solidFill>
-              </a:defRPr>
-            </a:lvl1pPr>
-          </a:lstStyle>
-          <a:p>
-            <a:r>
-              <a:rPr lang="en-US" dirty="0"/>
-              <a:t>Click to edit Master title style</a:t>
-            </a:r>
-          </a:p>
-        </p:txBody>
-      </p:sp>
-    </p:spTree>
-    <p:extLst>
-      <p:ext uri="{BB962C8B-B14F-4D97-AF65-F5344CB8AC3E}">
-        <p14:creationId xmlns:p14="http://schemas.microsoft.com/office/powerpoint/2010/main" val="1073069076"/>
-      </p:ext>
-    </p:extLst>
-  </p:cSld>
-  <p:clrMapOvr>
-    <a:masterClrMapping/>
-  </p:clrMapOvr>
-</p:sldLayout>
-</file>
-
-<file path=ppt/slideLayouts/slideLayout3.xml><?xml version="1.0" encoding="utf-8"?>
 <p:sldLayout xmlns:a="http://schemas.openxmlformats.org/drawingml/2006/main" xmlns:r="http://schemas.openxmlformats.org/officeDocument/2006/relationships" xmlns:p="http://schemas.openxmlformats.org/presentationml/2006/main" type="obj" preserve="1">
   <p:cSld name="Title and Content">
     <p:spTree>
@@ -921,10 +1083,10 @@
       </p:grpSpPr>
       <p:sp>
         <p:nvSpPr>
-          <p:cNvPr id="7" name="Freeform 9">
+          <p:cNvPr id="9" name="Freeform 9">
             <a:extLst>
               <a:ext uri="{FF2B5EF4-FFF2-40B4-BE49-F238E27FC236}">
-                <a16:creationId xmlns:a16="http://schemas.microsoft.com/office/drawing/2014/main" id="{08A8EB7F-D923-FDC0-FE22-EE79744B02C6}"/>
+                <a16:creationId xmlns:a16="http://schemas.microsoft.com/office/drawing/2014/main" id="{A4D20132-BDE7-D35A-BA8B-593727A0D781}"/>
               </a:ext>
               <a:ext uri="{C183D7F6-B498-43B3-948B-1728B52AA6E4}">
                 <adec:decorative xmlns:adec="http://schemas.microsoft.com/office/drawing/2017/decorative" val="1"/>
@@ -1027,158 +1189,12 @@
           </a:p>
         </p:txBody>
       </p:sp>
-      <p:sp>
-        <p:nvSpPr>
-          <p:cNvPr id="2" name="Title 1"/>
-          <p:cNvSpPr>
-            <a:spLocks noGrp="1"/>
-          </p:cNvSpPr>
-          <p:nvPr>
-            <p:ph type="title"/>
-          </p:nvPr>
-        </p:nvSpPr>
-        <p:spPr/>
-        <p:txBody>
-          <a:bodyPr/>
-          <a:lstStyle>
-            <a:lvl1pPr>
-              <a:defRPr>
-                <a:solidFill>
-                  <a:schemeClr val="bg1"/>
-                </a:solidFill>
-              </a:defRPr>
-            </a:lvl1pPr>
-          </a:lstStyle>
-          <a:p>
-            <a:r>
-              <a:rPr lang="en-US"/>
-              <a:t>Click to edit Master title style</a:t>
-            </a:r>
-          </a:p>
-        </p:txBody>
-      </p:sp>
-      <p:sp>
-        <p:nvSpPr>
-          <p:cNvPr id="3" name="Content Placeholder 2"/>
-          <p:cNvSpPr>
-            <a:spLocks noGrp="1"/>
-          </p:cNvSpPr>
-          <p:nvPr>
-            <p:ph idx="1"/>
-          </p:nvPr>
-        </p:nvSpPr>
-        <p:spPr/>
-        <p:txBody>
-          <a:bodyPr/>
-          <a:lstStyle/>
-          <a:p>
-            <a:pPr lvl="0"/>
-            <a:r>
-              <a:rPr lang="en-US" dirty="0"/>
-              <a:t>Click to edit Master text styles</a:t>
-            </a:r>
-          </a:p>
-          <a:p>
-            <a:pPr lvl="1"/>
-            <a:r>
-              <a:rPr lang="en-US" dirty="0"/>
-              <a:t>Second level</a:t>
-            </a:r>
-          </a:p>
-          <a:p>
-            <a:pPr lvl="2"/>
-            <a:r>
-              <a:rPr lang="en-US" dirty="0"/>
-              <a:t>Third level</a:t>
-            </a:r>
-          </a:p>
-          <a:p>
-            <a:pPr lvl="3"/>
-            <a:r>
-              <a:rPr lang="en-US" dirty="0"/>
-              <a:t>Fourth level</a:t>
-            </a:r>
-          </a:p>
-          <a:p>
-            <a:pPr lvl="4"/>
-            <a:r>
-              <a:rPr lang="en-US" dirty="0"/>
-              <a:t>Fifth level</a:t>
-            </a:r>
-          </a:p>
-        </p:txBody>
-      </p:sp>
-      <p:sp>
-        <p:nvSpPr>
-          <p:cNvPr id="4" name="Date Placeholder 3"/>
-          <p:cNvSpPr>
-            <a:spLocks noGrp="1"/>
-          </p:cNvSpPr>
-          <p:nvPr>
-            <p:ph type="dt" sz="half" idx="10"/>
-          </p:nvPr>
-        </p:nvSpPr>
-        <p:spPr/>
-        <p:txBody>
-          <a:bodyPr/>
-          <a:lstStyle/>
-          <a:p>
-            <a:fld id="{241EB5C9-1307-BA42-ABA2-0BC069CD8E7F}" type="datetimeFigureOut">
-              <a:rPr lang="en-US" smtClean="0"/>
-              <a:t>6/27/2024</a:t>
-            </a:fld>
-            <a:endParaRPr lang="en-US"/>
-          </a:p>
-        </p:txBody>
-      </p:sp>
-      <p:sp>
-        <p:nvSpPr>
-          <p:cNvPr id="5" name="Footer Placeholder 4"/>
-          <p:cNvSpPr>
-            <a:spLocks noGrp="1"/>
-          </p:cNvSpPr>
-          <p:nvPr>
-            <p:ph type="ftr" sz="quarter" idx="11"/>
-          </p:nvPr>
-        </p:nvSpPr>
-        <p:spPr/>
-        <p:txBody>
-          <a:bodyPr/>
-          <a:lstStyle/>
-          <a:p>
-            <a:endParaRPr lang="en-US"/>
-          </a:p>
-        </p:txBody>
-      </p:sp>
-      <p:sp>
-        <p:nvSpPr>
-          <p:cNvPr id="6" name="Slide Number Placeholder 5"/>
-          <p:cNvSpPr>
-            <a:spLocks noGrp="1"/>
-          </p:cNvSpPr>
-          <p:nvPr>
-            <p:ph type="sldNum" sz="quarter" idx="12"/>
-          </p:nvPr>
-        </p:nvSpPr>
-        <p:spPr/>
-        <p:txBody>
-          <a:bodyPr/>
-          <a:lstStyle/>
-          <a:p>
-            <a:fld id="{C5EF2332-01BF-834F-8236-50238282D533}" type="slidenum">
-              <a:rPr lang="en-US" smtClean="0"/>
-              <a:t>‹#›</a:t>
-            </a:fld>
-            <a:endParaRPr lang="en-US"/>
-          </a:p>
-        </p:txBody>
-      </p:sp>
       <p:pic>
         <p:nvPicPr>
-          <p:cNvPr id="8" name="Picture 7">
+          <p:cNvPr id="10" name="Picture 9">
             <a:extLst>
               <a:ext uri="{FF2B5EF4-FFF2-40B4-BE49-F238E27FC236}">
-                <a16:creationId xmlns:a16="http://schemas.microsoft.com/office/drawing/2014/main" id="{489145EC-81E6-8393-F9B9-866990E31E65}"/>
+                <a16:creationId xmlns:a16="http://schemas.microsoft.com/office/drawing/2014/main" id="{9EB38BA9-7090-F776-361A-7BFBECDD60F9}"/>
               </a:ext>
               <a:ext uri="{C183D7F6-B498-43B3-948B-1728B52AA6E4}">
                 <adec:decorative xmlns:adec="http://schemas.microsoft.com/office/drawing/2017/decorative" val="1"/>
@@ -1205,6 +1221,152 @@
           </a:prstGeom>
         </p:spPr>
       </p:pic>
+      <p:sp>
+        <p:nvSpPr>
+          <p:cNvPr id="2" name="Title 1"/>
+          <p:cNvSpPr>
+            <a:spLocks noGrp="1"/>
+          </p:cNvSpPr>
+          <p:nvPr>
+            <p:ph type="title"/>
+          </p:nvPr>
+        </p:nvSpPr>
+        <p:spPr/>
+        <p:txBody>
+          <a:bodyPr/>
+          <a:lstStyle>
+            <a:lvl1pPr>
+              <a:defRPr>
+                <a:solidFill>
+                  <a:schemeClr val="bg1"/>
+                </a:solidFill>
+              </a:defRPr>
+            </a:lvl1pPr>
+          </a:lstStyle>
+          <a:p>
+            <a:r>
+              <a:rPr lang="en-US" dirty="0"/>
+              <a:t>Click to edit Master title style</a:t>
+            </a:r>
+          </a:p>
+        </p:txBody>
+      </p:sp>
+      <p:sp>
+        <p:nvSpPr>
+          <p:cNvPr id="3" name="Content Placeholder 2"/>
+          <p:cNvSpPr>
+            <a:spLocks noGrp="1"/>
+          </p:cNvSpPr>
+          <p:nvPr>
+            <p:ph idx="1"/>
+          </p:nvPr>
+        </p:nvSpPr>
+        <p:spPr/>
+        <p:txBody>
+          <a:bodyPr/>
+          <a:lstStyle/>
+          <a:p>
+            <a:pPr lvl="0"/>
+            <a:r>
+              <a:rPr lang="en-US" dirty="0"/>
+              <a:t>Click to edit Master text styles</a:t>
+            </a:r>
+          </a:p>
+          <a:p>
+            <a:pPr lvl="1"/>
+            <a:r>
+              <a:rPr lang="en-US" dirty="0"/>
+              <a:t>Second level</a:t>
+            </a:r>
+          </a:p>
+          <a:p>
+            <a:pPr lvl="2"/>
+            <a:r>
+              <a:rPr lang="en-US" dirty="0"/>
+              <a:t>Third level</a:t>
+            </a:r>
+          </a:p>
+          <a:p>
+            <a:pPr lvl="3"/>
+            <a:r>
+              <a:rPr lang="en-US" dirty="0"/>
+              <a:t>Fourth level</a:t>
+            </a:r>
+          </a:p>
+          <a:p>
+            <a:pPr lvl="4"/>
+            <a:r>
+              <a:rPr lang="en-US" dirty="0"/>
+              <a:t>Fifth level</a:t>
+            </a:r>
+          </a:p>
+        </p:txBody>
+      </p:sp>
+      <p:sp>
+        <p:nvSpPr>
+          <p:cNvPr id="4" name="Date Placeholder 3"/>
+          <p:cNvSpPr>
+            <a:spLocks noGrp="1"/>
+          </p:cNvSpPr>
+          <p:nvPr>
+            <p:ph type="dt" sz="half" idx="10"/>
+          </p:nvPr>
+        </p:nvSpPr>
+        <p:spPr/>
+        <p:txBody>
+          <a:bodyPr/>
+          <a:lstStyle/>
+          <a:p>
+            <a:fld id="{241EB5C9-1307-BA42-ABA2-0BC069CD8E7F}" type="datetimeFigureOut">
+              <a:rPr lang="en-US" smtClean="0"/>
+              <a:t>7/1/2024</a:t>
+            </a:fld>
+            <a:endParaRPr lang="en-US"/>
+          </a:p>
+        </p:txBody>
+      </p:sp>
+      <p:sp>
+        <p:nvSpPr>
+          <p:cNvPr id="5" name="Footer Placeholder 4"/>
+          <p:cNvSpPr>
+            <a:spLocks noGrp="1"/>
+          </p:cNvSpPr>
+          <p:nvPr>
+            <p:ph type="ftr" sz="quarter" idx="11"/>
+          </p:nvPr>
+        </p:nvSpPr>
+        <p:spPr/>
+        <p:txBody>
+          <a:bodyPr/>
+          <a:lstStyle/>
+          <a:p>
+            <a:endParaRPr lang="en-US"/>
+          </a:p>
+        </p:txBody>
+      </p:sp>
+      <p:sp>
+        <p:nvSpPr>
+          <p:cNvPr id="6" name="Slide Number Placeholder 5"/>
+          <p:cNvSpPr>
+            <a:spLocks noGrp="1"/>
+          </p:cNvSpPr>
+          <p:nvPr>
+            <p:ph type="sldNum" sz="quarter" idx="12"/>
+          </p:nvPr>
+        </p:nvSpPr>
+        <p:spPr/>
+        <p:txBody>
+          <a:bodyPr/>
+          <a:lstStyle/>
+          <a:p>
+            <a:fld id="{C5EF2332-01BF-834F-8236-50238282D533}" type="slidenum">
+              <a:rPr lang="en-US" smtClean="0"/>
+              <a:t>‹#›</a:t>
+            </a:fld>
+            <a:endParaRPr lang="en-US"/>
+          </a:p>
+        </p:txBody>
+      </p:sp>
     </p:spTree>
     <p:extLst>
       <p:ext uri="{BB962C8B-B14F-4D97-AF65-F5344CB8AC3E}">
@@ -1218,7 +1380,7 @@
 </p:sldLayout>
 </file>
 
-<file path=ppt/slideLayouts/slideLayout4.xml><?xml version="1.0" encoding="utf-8"?>
+<file path=ppt/slideLayouts/slideLayout3.xml><?xml version="1.0" encoding="utf-8"?>
 <p:sldLayout xmlns:a="http://schemas.openxmlformats.org/drawingml/2006/main" xmlns:r="http://schemas.openxmlformats.org/officeDocument/2006/relationships" xmlns:p="http://schemas.openxmlformats.org/presentationml/2006/main" type="twoObj" preserve="1">
   <p:cSld name="Two Content">
     <p:spTree>
@@ -1240,7 +1402,7 @@
           <p:cNvPr id="8" name="Freeform 9">
             <a:extLst>
               <a:ext uri="{FF2B5EF4-FFF2-40B4-BE49-F238E27FC236}">
-                <a16:creationId xmlns:a16="http://schemas.microsoft.com/office/drawing/2014/main" id="{06B06686-99F9-524D-E743-97A4ABD1A820}"/>
+                <a16:creationId xmlns:a16="http://schemas.microsoft.com/office/drawing/2014/main" id="{08A8EB7F-D923-FDC0-FE22-EE79744B02C6}"/>
               </a:ext>
               <a:ext uri="{C183D7F6-B498-43B3-948B-1728B52AA6E4}">
                 <adec:decorative xmlns:adec="http://schemas.microsoft.com/office/drawing/2017/decorative" val="1"/>
@@ -1348,7 +1510,7 @@
           <p:cNvPr id="9" name="Picture 8">
             <a:extLst>
               <a:ext uri="{FF2B5EF4-FFF2-40B4-BE49-F238E27FC236}">
-                <a16:creationId xmlns:a16="http://schemas.microsoft.com/office/drawing/2014/main" id="{1DADD02E-CC8C-5696-9B44-AFAF76F44FF3}"/>
+                <a16:creationId xmlns:a16="http://schemas.microsoft.com/office/drawing/2014/main" id="{489145EC-81E6-8393-F9B9-866990E31E65}"/>
               </a:ext>
               <a:ext uri="{C183D7F6-B498-43B3-948B-1728B52AA6E4}">
                 <adec:decorative xmlns:adec="http://schemas.microsoft.com/office/drawing/2017/decorative" val="1"/>
@@ -1390,6 +1552,9 @@
           <a:bodyPr/>
           <a:lstStyle>
             <a:lvl1pPr>
+              <a:tabLst>
+                <a:tab pos="538163" algn="l"/>
+              </a:tabLst>
               <a:defRPr>
                 <a:solidFill>
                   <a:schemeClr val="bg1"/>
@@ -1399,7 +1564,7 @@
           </a:lstStyle>
           <a:p>
             <a:r>
-              <a:rPr lang="en-US"/>
+              <a:rPr lang="en-US" dirty="0"/>
               <a:t>Click to edit Master title style</a:t>
             </a:r>
           </a:p>
@@ -1417,8 +1582,8 @@
         </p:nvSpPr>
         <p:spPr>
           <a:xfrm>
-            <a:off x="201600" y="1200151"/>
-            <a:ext cx="4294200" cy="3394472"/>
+            <a:off x="212411" y="1200151"/>
+            <a:ext cx="4283389" cy="3394472"/>
           </a:xfrm>
         </p:spPr>
         <p:txBody>
@@ -1455,35 +1620,35 @@
           <a:p>
             <a:pPr lvl="0"/>
             <a:r>
-              <a:rPr lang="en-US"/>
+              <a:rPr lang="en-US" dirty="0"/>
               <a:t>Click to edit Master text styles</a:t>
             </a:r>
           </a:p>
           <a:p>
             <a:pPr lvl="1"/>
             <a:r>
-              <a:rPr lang="en-US"/>
+              <a:rPr lang="en-US" dirty="0"/>
               <a:t>Second level</a:t>
             </a:r>
           </a:p>
           <a:p>
             <a:pPr lvl="2"/>
             <a:r>
-              <a:rPr lang="en-US"/>
+              <a:rPr lang="en-US" dirty="0"/>
               <a:t>Third level</a:t>
             </a:r>
           </a:p>
           <a:p>
             <a:pPr lvl="3"/>
             <a:r>
-              <a:rPr lang="en-US"/>
+              <a:rPr lang="en-US" dirty="0"/>
               <a:t>Fourth level</a:t>
             </a:r>
           </a:p>
           <a:p>
             <a:pPr lvl="4"/>
             <a:r>
-              <a:rPr lang="en-US"/>
+              <a:rPr lang="en-US" dirty="0"/>
               <a:t>Fifth level</a:t>
             </a:r>
           </a:p>
@@ -1501,8 +1666,8 @@
         </p:nvSpPr>
         <p:spPr>
           <a:xfrm>
-            <a:off x="4648199" y="1200151"/>
-            <a:ext cx="4294199" cy="3394472"/>
+            <a:off x="4648200" y="1200151"/>
+            <a:ext cx="4294200" cy="3394472"/>
           </a:xfrm>
         </p:spPr>
         <p:txBody>
@@ -1590,7 +1755,7 @@
           <a:p>
             <a:fld id="{241EB5C9-1307-BA42-ABA2-0BC069CD8E7F}" type="datetimeFigureOut">
               <a:rPr lang="en-US" smtClean="0"/>
-              <a:t>6/27/2024</a:t>
+              <a:t>7/1/2024</a:t>
             </a:fld>
             <a:endParaRPr lang="en-US"/>
           </a:p>
@@ -1651,7 +1816,7 @@
 </p:sldLayout>
 </file>
 
-<file path=ppt/slideLayouts/slideLayout5.xml><?xml version="1.0" encoding="utf-8"?>
+<file path=ppt/slideLayouts/slideLayout4.xml><?xml version="1.0" encoding="utf-8"?>
 <p:sldLayout xmlns:a="http://schemas.openxmlformats.org/drawingml/2006/main" xmlns:r="http://schemas.openxmlformats.org/officeDocument/2006/relationships" xmlns:p="http://schemas.openxmlformats.org/presentationml/2006/main" type="twoTxTwoObj" preserve="1">
   <p:cSld name="Comparison">
     <p:spTree>
@@ -1673,7 +1838,7 @@
           <p:cNvPr id="10" name="Freeform 9">
             <a:extLst>
               <a:ext uri="{FF2B5EF4-FFF2-40B4-BE49-F238E27FC236}">
-                <a16:creationId xmlns:a16="http://schemas.microsoft.com/office/drawing/2014/main" id="{CA87E3DD-8344-E623-DDB3-E79E347AB71F}"/>
+                <a16:creationId xmlns:a16="http://schemas.microsoft.com/office/drawing/2014/main" id="{21456DE8-D48B-6C26-B0A6-5C694958E403}"/>
               </a:ext>
               <a:ext uri="{C183D7F6-B498-43B3-948B-1728B52AA6E4}">
                 <adec:decorative xmlns:adec="http://schemas.microsoft.com/office/drawing/2017/decorative" val="1"/>
@@ -1781,7 +1946,7 @@
           <p:cNvPr id="11" name="Picture 10">
             <a:extLst>
               <a:ext uri="{FF2B5EF4-FFF2-40B4-BE49-F238E27FC236}">
-                <a16:creationId xmlns:a16="http://schemas.microsoft.com/office/drawing/2014/main" id="{174598DC-C5CA-9501-34A5-D3366850C5FF}"/>
+                <a16:creationId xmlns:a16="http://schemas.microsoft.com/office/drawing/2014/main" id="{6B001646-A555-007C-6D0C-559C50C15079}"/>
               </a:ext>
               <a:ext uri="{C183D7F6-B498-43B3-948B-1728B52AA6E4}">
                 <adec:decorative xmlns:adec="http://schemas.microsoft.com/office/drawing/2017/decorative" val="1"/>
@@ -1832,7 +1997,7 @@
           </a:lstStyle>
           <a:p>
             <a:r>
-              <a:rPr lang="en-US"/>
+              <a:rPr lang="en-US" dirty="0"/>
               <a:t>Click to edit Master title style</a:t>
             </a:r>
           </a:p>
@@ -1897,7 +2062,7 @@
           <a:p>
             <a:pPr lvl="0"/>
             <a:r>
-              <a:rPr lang="en-US" dirty="0"/>
+              <a:rPr lang="en-US"/>
               <a:t>Click to edit Master text styles</a:t>
             </a:r>
           </a:p>
@@ -2046,7 +2211,7 @@
           <a:p>
             <a:pPr lvl="0"/>
             <a:r>
-              <a:rPr lang="en-US" dirty="0"/>
+              <a:rPr lang="en-US"/>
               <a:t>Click to edit Master text styles</a:t>
             </a:r>
           </a:p>
@@ -2153,7 +2318,7 @@
           <a:p>
             <a:fld id="{241EB5C9-1307-BA42-ABA2-0BC069CD8E7F}" type="datetimeFigureOut">
               <a:rPr lang="en-US" smtClean="0"/>
-              <a:t>6/27/2024</a:t>
+              <a:t>7/1/2024</a:t>
             </a:fld>
             <a:endParaRPr lang="en-US"/>
           </a:p>
@@ -2214,7 +2379,7 @@
 </p:sldLayout>
 </file>
 
-<file path=ppt/slideLayouts/slideLayout6.xml><?xml version="1.0" encoding="utf-8"?>
+<file path=ppt/slideLayouts/slideLayout5.xml><?xml version="1.0" encoding="utf-8"?>
 <p:sldLayout xmlns:a="http://schemas.openxmlformats.org/drawingml/2006/main" xmlns:r="http://schemas.openxmlformats.org/officeDocument/2006/relationships" xmlns:p="http://schemas.openxmlformats.org/presentationml/2006/main" type="objTx" preserve="1">
   <p:cSld name="Content with Caption">
     <p:spTree>
@@ -2236,7 +2401,7 @@
           <p:cNvPr id="8" name="Freeform 9">
             <a:extLst>
               <a:ext uri="{FF2B5EF4-FFF2-40B4-BE49-F238E27FC236}">
-                <a16:creationId xmlns:a16="http://schemas.microsoft.com/office/drawing/2014/main" id="{5A074BB3-F232-F3EA-FEC2-546140517246}"/>
+                <a16:creationId xmlns:a16="http://schemas.microsoft.com/office/drawing/2014/main" id="{1A709076-DE9B-20FB-F39D-1C2476D6CC5A}"/>
               </a:ext>
               <a:ext uri="{C183D7F6-B498-43B3-948B-1728B52AA6E4}">
                 <adec:decorative xmlns:adec="http://schemas.microsoft.com/office/drawing/2017/decorative" val="1"/>
@@ -2344,7 +2509,7 @@
           <p:cNvPr id="9" name="Picture 8">
             <a:extLst>
               <a:ext uri="{FF2B5EF4-FFF2-40B4-BE49-F238E27FC236}">
-                <a16:creationId xmlns:a16="http://schemas.microsoft.com/office/drawing/2014/main" id="{37D815DB-9EB8-5D70-17C0-A1FF37807FEA}"/>
+                <a16:creationId xmlns:a16="http://schemas.microsoft.com/office/drawing/2014/main" id="{7CB2B103-2604-6188-01E6-1F019BBB6224}"/>
               </a:ext>
               <a:ext uri="{C183D7F6-B498-43B3-948B-1728B52AA6E4}">
                 <adec:decorative xmlns:adec="http://schemas.microsoft.com/office/drawing/2017/decorative" val="1"/>
@@ -2384,16 +2549,16 @@
         <p:spPr>
           <a:xfrm>
             <a:off x="201600" y="204787"/>
-            <a:ext cx="5634423" cy="616013"/>
+            <a:ext cx="5579999" cy="641546"/>
           </a:xfrm>
         </p:spPr>
         <p:txBody>
-          <a:bodyPr vert="horz" lIns="91440" tIns="45720" rIns="91440" bIns="45720" rtlCol="0" anchor="ctr">
-            <a:normAutofit/>
+          <a:bodyPr anchor="ctr">
+            <a:noAutofit/>
           </a:bodyPr>
           <a:lstStyle>
-            <a:lvl1pPr>
-              <a:defRPr lang="en-US">
+            <a:lvl1pPr algn="l">
+              <a:defRPr sz="2800" b="0">
                 <a:solidFill>
                   <a:schemeClr val="bg1"/>
                 </a:solidFill>
@@ -2401,9 +2566,8 @@
             </a:lvl1pPr>
           </a:lstStyle>
           <a:p>
-            <a:pPr lvl="0"/>
-            <a:r>
-              <a:rPr lang="en-US"/>
+            <a:r>
+              <a:rPr lang="en-US" dirty="0"/>
               <a:t>Click to edit Master title style</a:t>
             </a:r>
           </a:p>
@@ -2421,8 +2585,8 @@
         </p:nvSpPr>
         <p:spPr>
           <a:xfrm>
-            <a:off x="3575049" y="1179403"/>
-            <a:ext cx="5367349" cy="3415220"/>
+            <a:off x="3575049" y="1212742"/>
+            <a:ext cx="5367349" cy="3381881"/>
           </a:xfrm>
         </p:spPr>
         <p:txBody>
@@ -2505,8 +2669,8 @@
         </p:nvSpPr>
         <p:spPr>
           <a:xfrm>
-            <a:off x="201601" y="1179403"/>
-            <a:ext cx="3263914" cy="3415220"/>
+            <a:off x="201601" y="1212742"/>
+            <a:ext cx="3263914" cy="3381881"/>
           </a:xfrm>
         </p:spPr>
         <p:txBody>
@@ -2554,7 +2718,7 @@
           <a:p>
             <a:pPr lvl="0"/>
             <a:r>
-              <a:rPr lang="en-US" dirty="0"/>
+              <a:rPr lang="en-US"/>
               <a:t>Click to edit Master text styles</a:t>
             </a:r>
           </a:p>
@@ -2577,7 +2741,7 @@
           <a:p>
             <a:fld id="{241EB5C9-1307-BA42-ABA2-0BC069CD8E7F}" type="datetimeFigureOut">
               <a:rPr lang="en-US" smtClean="0"/>
-              <a:t>6/27/2024</a:t>
+              <a:t>7/1/2024</a:t>
             </a:fld>
             <a:endParaRPr lang="en-US"/>
           </a:p>
@@ -2629,6 +2793,271 @@
     <p:extLst>
       <p:ext uri="{BB962C8B-B14F-4D97-AF65-F5344CB8AC3E}">
         <p14:creationId xmlns:p14="http://schemas.microsoft.com/office/powerpoint/2010/main" val="3540895647"/>
+      </p:ext>
+    </p:extLst>
+  </p:cSld>
+  <p:clrMapOvr>
+    <a:masterClrMapping/>
+  </p:clrMapOvr>
+</p:sldLayout>
+</file>
+
+<file path=ppt/slideLayouts/slideLayout6.xml><?xml version="1.0" encoding="utf-8"?>
+<p:sldLayout xmlns:a="http://schemas.openxmlformats.org/drawingml/2006/main" xmlns:r="http://schemas.openxmlformats.org/officeDocument/2006/relationships" xmlns:p="http://schemas.openxmlformats.org/presentationml/2006/main" type="titleOnly" preserve="1">
+  <p:cSld name="Title Only">
+    <p:spTree>
+      <p:nvGrpSpPr>
+        <p:cNvPr id="1" name=""/>
+        <p:cNvGrpSpPr/>
+        <p:nvPr/>
+      </p:nvGrpSpPr>
+      <p:grpSpPr>
+        <a:xfrm>
+          <a:off x="0" y="0"/>
+          <a:ext cx="0" cy="0"/>
+          <a:chOff x="0" y="0"/>
+          <a:chExt cx="0" cy="0"/>
+        </a:xfrm>
+      </p:grpSpPr>
+      <p:sp>
+        <p:nvSpPr>
+          <p:cNvPr id="6" name="Freeform 9">
+            <a:extLst>
+              <a:ext uri="{FF2B5EF4-FFF2-40B4-BE49-F238E27FC236}">
+                <a16:creationId xmlns:a16="http://schemas.microsoft.com/office/drawing/2014/main" id="{4EAFBC31-AA9D-BD30-C765-E0125AE4C4CA}"/>
+              </a:ext>
+              <a:ext uri="{C183D7F6-B498-43B3-948B-1728B52AA6E4}">
+                <adec:decorative xmlns:adec="http://schemas.microsoft.com/office/drawing/2017/decorative" val="1"/>
+              </a:ext>
+            </a:extLst>
+          </p:cNvPr>
+          <p:cNvSpPr/>
+          <p:nvPr userDrawn="1"/>
+        </p:nvSpPr>
+        <p:spPr>
+          <a:xfrm>
+            <a:off x="-9236" y="0"/>
+            <a:ext cx="6031345" cy="1006763"/>
+          </a:xfrm>
+          <a:custGeom>
+            <a:avLst/>
+            <a:gdLst>
+              <a:gd name="connsiteX0" fmla="*/ 9236 w 6031345"/>
+              <a:gd name="connsiteY0" fmla="*/ 0 h 1006763"/>
+              <a:gd name="connsiteX1" fmla="*/ 6031345 w 6031345"/>
+              <a:gd name="connsiteY1" fmla="*/ 0 h 1006763"/>
+              <a:gd name="connsiteX2" fmla="*/ 5800436 w 6031345"/>
+              <a:gd name="connsiteY2" fmla="*/ 1006763 h 1006763"/>
+              <a:gd name="connsiteX3" fmla="*/ 0 w 6031345"/>
+              <a:gd name="connsiteY3" fmla="*/ 1006763 h 1006763"/>
+              <a:gd name="connsiteX4" fmla="*/ 9236 w 6031345"/>
+              <a:gd name="connsiteY4" fmla="*/ 0 h 1006763"/>
+            </a:gdLst>
+            <a:ahLst/>
+            <a:cxnLst>
+              <a:cxn ang="0">
+                <a:pos x="connsiteX0" y="connsiteY0"/>
+              </a:cxn>
+              <a:cxn ang="0">
+                <a:pos x="connsiteX1" y="connsiteY1"/>
+              </a:cxn>
+              <a:cxn ang="0">
+                <a:pos x="connsiteX2" y="connsiteY2"/>
+              </a:cxn>
+              <a:cxn ang="0">
+                <a:pos x="connsiteX3" y="connsiteY3"/>
+              </a:cxn>
+              <a:cxn ang="0">
+                <a:pos x="connsiteX4" y="connsiteY4"/>
+              </a:cxn>
+            </a:cxnLst>
+            <a:rect l="l" t="t" r="r" b="b"/>
+            <a:pathLst>
+              <a:path w="6031345" h="1006763">
+                <a:moveTo>
+                  <a:pt x="9236" y="0"/>
+                </a:moveTo>
+                <a:lnTo>
+                  <a:pt x="6031345" y="0"/>
+                </a:lnTo>
+                <a:lnTo>
+                  <a:pt x="5800436" y="1006763"/>
+                </a:lnTo>
+                <a:lnTo>
+                  <a:pt x="0" y="1006763"/>
+                </a:lnTo>
+                <a:cubicBezTo>
+                  <a:pt x="3079" y="671175"/>
+                  <a:pt x="6157" y="335588"/>
+                  <a:pt x="9236" y="0"/>
+                </a:cubicBezTo>
+                <a:close/>
+              </a:path>
+            </a:pathLst>
+          </a:custGeom>
+          <a:solidFill>
+            <a:srgbClr val="E1239A"/>
+          </a:solidFill>
+          <a:ln>
+            <a:noFill/>
+          </a:ln>
+        </p:spPr>
+        <p:style>
+          <a:lnRef idx="2">
+            <a:schemeClr val="accent1">
+              <a:shade val="50000"/>
+            </a:schemeClr>
+          </a:lnRef>
+          <a:fillRef idx="1">
+            <a:schemeClr val="accent1"/>
+          </a:fillRef>
+          <a:effectRef idx="0">
+            <a:schemeClr val="accent1"/>
+          </a:effectRef>
+          <a:fontRef idx="minor">
+            <a:schemeClr val="lt1"/>
+          </a:fontRef>
+        </p:style>
+        <p:txBody>
+          <a:bodyPr rtlCol="0" anchor="ctr"/>
+          <a:lstStyle/>
+          <a:p>
+            <a:pPr algn="ctr"/>
+            <a:endParaRPr lang="en-US"/>
+          </a:p>
+        </p:txBody>
+      </p:sp>
+      <p:pic>
+        <p:nvPicPr>
+          <p:cNvPr id="7" name="Picture 6">
+            <a:extLst>
+              <a:ext uri="{FF2B5EF4-FFF2-40B4-BE49-F238E27FC236}">
+                <a16:creationId xmlns:a16="http://schemas.microsoft.com/office/drawing/2014/main" id="{233CE57B-D002-96FA-12E0-2D458286118F}"/>
+              </a:ext>
+              <a:ext uri="{C183D7F6-B498-43B3-948B-1728B52AA6E4}">
+                <adec:decorative xmlns:adec="http://schemas.microsoft.com/office/drawing/2017/decorative" val="1"/>
+              </a:ext>
+            </a:extLst>
+          </p:cNvPr>
+          <p:cNvPicPr>
+            <a:picLocks noChangeAspect="1"/>
+          </p:cNvPicPr>
+          <p:nvPr userDrawn="1"/>
+        </p:nvPicPr>
+        <p:blipFill>
+          <a:blip r:embed="rId2"/>
+          <a:srcRect/>
+          <a:stretch/>
+        </p:blipFill>
+        <p:spPr>
+          <a:xfrm>
+            <a:off x="7830787" y="261"/>
+            <a:ext cx="1257270" cy="1269477"/>
+          </a:xfrm>
+          <a:prstGeom prst="rect">
+            <a:avLst/>
+          </a:prstGeom>
+        </p:spPr>
+      </p:pic>
+      <p:sp>
+        <p:nvSpPr>
+          <p:cNvPr id="2" name="Title 1"/>
+          <p:cNvSpPr>
+            <a:spLocks noGrp="1"/>
+          </p:cNvSpPr>
+          <p:nvPr>
+            <p:ph type="title"/>
+          </p:nvPr>
+        </p:nvSpPr>
+        <p:spPr/>
+        <p:txBody>
+          <a:bodyPr/>
+          <a:lstStyle>
+            <a:lvl1pPr>
+              <a:defRPr>
+                <a:solidFill>
+                  <a:schemeClr val="bg1"/>
+                </a:solidFill>
+              </a:defRPr>
+            </a:lvl1pPr>
+          </a:lstStyle>
+          <a:p>
+            <a:r>
+              <a:rPr lang="en-US"/>
+              <a:t>Click to edit Master title style</a:t>
+            </a:r>
+          </a:p>
+        </p:txBody>
+      </p:sp>
+      <p:sp>
+        <p:nvSpPr>
+          <p:cNvPr id="3" name="Date Placeholder 2"/>
+          <p:cNvSpPr>
+            <a:spLocks noGrp="1"/>
+          </p:cNvSpPr>
+          <p:nvPr>
+            <p:ph type="dt" sz="half" idx="10"/>
+          </p:nvPr>
+        </p:nvSpPr>
+        <p:spPr/>
+        <p:txBody>
+          <a:bodyPr/>
+          <a:lstStyle/>
+          <a:p>
+            <a:fld id="{241EB5C9-1307-BA42-ABA2-0BC069CD8E7F}" type="datetimeFigureOut">
+              <a:rPr lang="en-US" smtClean="0"/>
+              <a:t>7/1/2024</a:t>
+            </a:fld>
+            <a:endParaRPr lang="en-US"/>
+          </a:p>
+        </p:txBody>
+      </p:sp>
+      <p:sp>
+        <p:nvSpPr>
+          <p:cNvPr id="4" name="Footer Placeholder 3"/>
+          <p:cNvSpPr>
+            <a:spLocks noGrp="1"/>
+          </p:cNvSpPr>
+          <p:nvPr>
+            <p:ph type="ftr" sz="quarter" idx="11"/>
+          </p:nvPr>
+        </p:nvSpPr>
+        <p:spPr/>
+        <p:txBody>
+          <a:bodyPr/>
+          <a:lstStyle/>
+          <a:p>
+            <a:endParaRPr lang="en-US"/>
+          </a:p>
+        </p:txBody>
+      </p:sp>
+      <p:sp>
+        <p:nvSpPr>
+          <p:cNvPr id="5" name="Slide Number Placeholder 4"/>
+          <p:cNvSpPr>
+            <a:spLocks noGrp="1"/>
+          </p:cNvSpPr>
+          <p:nvPr>
+            <p:ph type="sldNum" sz="quarter" idx="12"/>
+          </p:nvPr>
+        </p:nvSpPr>
+        <p:spPr/>
+        <p:txBody>
+          <a:bodyPr/>
+          <a:lstStyle/>
+          <a:p>
+            <a:fld id="{C5EF2332-01BF-834F-8236-50238282D533}" type="slidenum">
+              <a:rPr lang="en-US" smtClean="0"/>
+              <a:t>‹#›</a:t>
+            </a:fld>
+            <a:endParaRPr lang="en-US"/>
+          </a:p>
+        </p:txBody>
+      </p:sp>
+    </p:spTree>
+    <p:extLst>
+      <p:ext uri="{BB962C8B-B14F-4D97-AF65-F5344CB8AC3E}">
+        <p14:creationId xmlns:p14="http://schemas.microsoft.com/office/powerpoint/2010/main" val="3472721253"/>
       </p:ext>
     </p:extLst>
   </p:cSld>
@@ -2672,7 +3101,7 @@
           <a:p>
             <a:fld id="{241EB5C9-1307-BA42-ABA2-0BC069CD8E7F}" type="datetimeFigureOut">
               <a:rPr lang="en-US" smtClean="0"/>
-              <a:t>6/27/2024</a:t>
+              <a:t>7/1/2024</a:t>
             </a:fld>
             <a:endParaRPr lang="en-US"/>
           </a:p>
@@ -2724,6 +3153,204 @@
     <p:extLst>
       <p:ext uri="{BB962C8B-B14F-4D97-AF65-F5344CB8AC3E}">
         <p14:creationId xmlns:p14="http://schemas.microsoft.com/office/powerpoint/2010/main" val="2130901097"/>
+      </p:ext>
+    </p:extLst>
+  </p:cSld>
+  <p:clrMapOvr>
+    <a:masterClrMapping/>
+  </p:clrMapOvr>
+</p:sldLayout>
+</file>
+
+<file path=ppt/slideLayouts/slideLayout8.xml><?xml version="1.0" encoding="utf-8"?>
+<p:sldLayout xmlns:a="http://schemas.openxmlformats.org/drawingml/2006/main" xmlns:r="http://schemas.openxmlformats.org/officeDocument/2006/relationships" xmlns:p="http://schemas.openxmlformats.org/presentationml/2006/main" type="secHead" preserve="1">
+  <p:cSld name="Section Header">
+    <p:bg>
+      <p:bgPr>
+        <a:blipFill dpi="0" rotWithShape="1">
+          <a:blip r:embed="rId2">
+            <a:lum/>
+          </a:blip>
+          <a:srcRect/>
+          <a:stretch>
+            <a:fillRect/>
+          </a:stretch>
+        </a:blipFill>
+        <a:effectLst/>
+      </p:bgPr>
+    </p:bg>
+    <p:spTree>
+      <p:nvGrpSpPr>
+        <p:cNvPr id="1" name=""/>
+        <p:cNvGrpSpPr/>
+        <p:nvPr/>
+      </p:nvGrpSpPr>
+      <p:grpSpPr>
+        <a:xfrm>
+          <a:off x="0" y="0"/>
+          <a:ext cx="0" cy="0"/>
+          <a:chOff x="0" y="0"/>
+          <a:chExt cx="0" cy="0"/>
+        </a:xfrm>
+      </p:grpSpPr>
+      <p:sp>
+        <p:nvSpPr>
+          <p:cNvPr id="2" name="Title 1"/>
+          <p:cNvSpPr>
+            <a:spLocks noGrp="1"/>
+          </p:cNvSpPr>
+          <p:nvPr>
+            <p:ph type="title"/>
+          </p:nvPr>
+        </p:nvSpPr>
+        <p:spPr>
+          <a:xfrm>
+            <a:off x="207113" y="1166923"/>
+            <a:ext cx="5038282" cy="2809654"/>
+          </a:xfrm>
+        </p:spPr>
+        <p:txBody>
+          <a:bodyPr anchor="ctr">
+            <a:normAutofit/>
+          </a:bodyPr>
+          <a:lstStyle>
+            <a:lvl1pPr algn="l">
+              <a:defRPr sz="2800" b="0" cap="none" baseline="0">
+                <a:solidFill>
+                  <a:schemeClr val="bg1"/>
+                </a:solidFill>
+              </a:defRPr>
+            </a:lvl1pPr>
+          </a:lstStyle>
+          <a:p>
+            <a:r>
+              <a:rPr lang="en-US" dirty="0"/>
+              <a:t>Click to edit Master title style</a:t>
+            </a:r>
+          </a:p>
+        </p:txBody>
+      </p:sp>
+      <p:sp>
+        <p:nvSpPr>
+          <p:cNvPr id="3" name="Text Placeholder 2"/>
+          <p:cNvSpPr>
+            <a:spLocks noGrp="1"/>
+          </p:cNvSpPr>
+          <p:nvPr>
+            <p:ph type="body" idx="1"/>
+          </p:nvPr>
+        </p:nvSpPr>
+        <p:spPr>
+          <a:xfrm>
+            <a:off x="207113" y="195291"/>
+            <a:ext cx="5038282" cy="971632"/>
+          </a:xfrm>
+        </p:spPr>
+        <p:txBody>
+          <a:bodyPr anchor="b"/>
+          <a:lstStyle>
+            <a:lvl1pPr marL="0" indent="0">
+              <a:buNone/>
+              <a:defRPr sz="1500">
+                <a:solidFill>
+                  <a:schemeClr val="bg1"/>
+                </a:solidFill>
+              </a:defRPr>
+            </a:lvl1pPr>
+            <a:lvl2pPr marL="342900" indent="0">
+              <a:buNone/>
+              <a:defRPr sz="1350">
+                <a:solidFill>
+                  <a:schemeClr val="tx1">
+                    <a:tint val="75000"/>
+                  </a:schemeClr>
+                </a:solidFill>
+              </a:defRPr>
+            </a:lvl2pPr>
+            <a:lvl3pPr marL="685800" indent="0">
+              <a:buNone/>
+              <a:defRPr sz="1200">
+                <a:solidFill>
+                  <a:schemeClr val="tx1">
+                    <a:tint val="75000"/>
+                  </a:schemeClr>
+                </a:solidFill>
+              </a:defRPr>
+            </a:lvl3pPr>
+            <a:lvl4pPr marL="1028700" indent="0">
+              <a:buNone/>
+              <a:defRPr sz="1050">
+                <a:solidFill>
+                  <a:schemeClr val="tx1">
+                    <a:tint val="75000"/>
+                  </a:schemeClr>
+                </a:solidFill>
+              </a:defRPr>
+            </a:lvl4pPr>
+            <a:lvl5pPr marL="1371600" indent="0">
+              <a:buNone/>
+              <a:defRPr sz="1050">
+                <a:solidFill>
+                  <a:schemeClr val="tx1">
+                    <a:tint val="75000"/>
+                  </a:schemeClr>
+                </a:solidFill>
+              </a:defRPr>
+            </a:lvl5pPr>
+            <a:lvl6pPr marL="1714500" indent="0">
+              <a:buNone/>
+              <a:defRPr sz="1050">
+                <a:solidFill>
+                  <a:schemeClr val="tx1">
+                    <a:tint val="75000"/>
+                  </a:schemeClr>
+                </a:solidFill>
+              </a:defRPr>
+            </a:lvl6pPr>
+            <a:lvl7pPr marL="2057400" indent="0">
+              <a:buNone/>
+              <a:defRPr sz="1050">
+                <a:solidFill>
+                  <a:schemeClr val="tx1">
+                    <a:tint val="75000"/>
+                  </a:schemeClr>
+                </a:solidFill>
+              </a:defRPr>
+            </a:lvl7pPr>
+            <a:lvl8pPr marL="2400300" indent="0">
+              <a:buNone/>
+              <a:defRPr sz="1050">
+                <a:solidFill>
+                  <a:schemeClr val="tx1">
+                    <a:tint val="75000"/>
+                  </a:schemeClr>
+                </a:solidFill>
+              </a:defRPr>
+            </a:lvl8pPr>
+            <a:lvl9pPr marL="2743200" indent="0">
+              <a:buNone/>
+              <a:defRPr sz="1050">
+                <a:solidFill>
+                  <a:schemeClr val="tx1">
+                    <a:tint val="75000"/>
+                  </a:schemeClr>
+                </a:solidFill>
+              </a:defRPr>
+            </a:lvl9pPr>
+          </a:lstStyle>
+          <a:p>
+            <a:pPr lvl="0"/>
+            <a:r>
+              <a:rPr lang="en-US"/>
+              <a:t>Click to edit Master text styles</a:t>
+            </a:r>
+          </a:p>
+        </p:txBody>
+      </p:sp>
+    </p:spTree>
+    <p:extLst>
+      <p:ext uri="{BB962C8B-B14F-4D97-AF65-F5344CB8AC3E}">
+        <p14:creationId xmlns:p14="http://schemas.microsoft.com/office/powerpoint/2010/main" val="1073069076"/>
       </p:ext>
     </p:extLst>
   </p:cSld>
@@ -2768,7 +3395,7 @@
         <p:spPr>
           <a:xfrm>
             <a:off x="201600" y="205979"/>
-            <a:ext cx="5580000" cy="614821"/>
+            <a:ext cx="5580000" cy="623085"/>
           </a:xfrm>
           <a:prstGeom prst="rect">
             <a:avLst/>
@@ -2800,7 +3427,7 @@
         <p:spPr>
           <a:xfrm>
             <a:off x="201600" y="1200151"/>
-            <a:ext cx="8755200" cy="3394472"/>
+            <a:ext cx="8740800" cy="3394472"/>
           </a:xfrm>
           <a:prstGeom prst="rect">
             <a:avLst/>
@@ -2861,16 +3488,14 @@
         <p:spPr>
           <a:xfrm>
             <a:off x="201600" y="4767263"/>
-            <a:ext cx="2133600" cy="273844"/>
+            <a:ext cx="2389200" cy="273844"/>
           </a:xfrm>
           <a:prstGeom prst="rect">
             <a:avLst/>
           </a:prstGeom>
         </p:spPr>
         <p:txBody>
-          <a:bodyPr vert="horz" lIns="91440" tIns="45720" rIns="91440" bIns="45720" rtlCol="0" anchor="ctr">
-            <a:normAutofit/>
-          </a:bodyPr>
+          <a:bodyPr vert="horz" lIns="91440" tIns="45720" rIns="91440" bIns="45720" rtlCol="0" anchor="ctr"/>
           <a:lstStyle>
             <a:lvl1pPr algn="l">
               <a:defRPr sz="900">
@@ -2885,7 +3510,7 @@
           <a:p>
             <a:fld id="{241EB5C9-1307-BA42-ABA2-0BC069CD8E7F}" type="datetimeFigureOut">
               <a:rPr lang="en-US" smtClean="0"/>
-              <a:t>6/27/2024</a:t>
+              <a:t>7/1/2024</a:t>
             </a:fld>
             <a:endParaRPr lang="en-US"/>
           </a:p>
@@ -2903,17 +3528,15 @@
         </p:nvSpPr>
         <p:spPr>
           <a:xfrm>
-            <a:off x="3124200" y="4767263"/>
-            <a:ext cx="2895600" cy="273844"/>
+            <a:off x="2743200" y="4767263"/>
+            <a:ext cx="3657600" cy="273844"/>
           </a:xfrm>
           <a:prstGeom prst="rect">
             <a:avLst/>
           </a:prstGeom>
         </p:spPr>
         <p:txBody>
-          <a:bodyPr vert="horz" lIns="91440" tIns="45720" rIns="91440" bIns="45720" rtlCol="0" anchor="ctr">
-            <a:normAutofit/>
-          </a:bodyPr>
+          <a:bodyPr vert="horz" lIns="91440" tIns="45720" rIns="91440" bIns="45720" rtlCol="0" anchor="ctr"/>
           <a:lstStyle>
             <a:lvl1pPr algn="ctr">
               <a:defRPr sz="900">
@@ -2926,7 +3549,7 @@
             </a:lvl1pPr>
           </a:lstStyle>
           <a:p>
-            <a:endParaRPr lang="en-US" dirty="0"/>
+            <a:endParaRPr lang="en-US"/>
           </a:p>
         </p:txBody>
       </p:sp>
@@ -2942,17 +3565,15 @@
         </p:nvSpPr>
         <p:spPr>
           <a:xfrm>
-            <a:off x="6823200" y="4767263"/>
-            <a:ext cx="2133600" cy="273844"/>
+            <a:off x="6553200" y="4767263"/>
+            <a:ext cx="2389200" cy="273844"/>
           </a:xfrm>
           <a:prstGeom prst="rect">
             <a:avLst/>
           </a:prstGeom>
         </p:spPr>
         <p:txBody>
-          <a:bodyPr vert="horz" lIns="91440" tIns="45720" rIns="91440" bIns="45720" rtlCol="0" anchor="ctr">
-            <a:normAutofit/>
-          </a:bodyPr>
+          <a:bodyPr vert="horz" lIns="91440" tIns="45720" rIns="91440" bIns="45720" rtlCol="0" anchor="ctr"/>
           <a:lstStyle>
             <a:lvl1pPr algn="r">
               <a:defRPr sz="900">
@@ -2983,12 +3604,13 @@
   <p:clrMap bg1="lt1" tx1="dk1" bg2="lt2" tx2="dk2" accent1="accent1" accent2="accent2" accent3="accent3" accent4="accent4" accent5="accent5" accent6="accent6" hlink="hlink" folHlink="folHlink"/>
   <p:sldLayoutIdLst>
     <p:sldLayoutId id="2147483649" r:id="rId1"/>
-    <p:sldLayoutId id="2147483651" r:id="rId2"/>
-    <p:sldLayoutId id="2147483650" r:id="rId3"/>
-    <p:sldLayoutId id="2147483652" r:id="rId4"/>
-    <p:sldLayoutId id="2147483653" r:id="rId5"/>
-    <p:sldLayoutId id="2147483656" r:id="rId6"/>
+    <p:sldLayoutId id="2147483650" r:id="rId2"/>
+    <p:sldLayoutId id="2147483652" r:id="rId3"/>
+    <p:sldLayoutId id="2147483653" r:id="rId4"/>
+    <p:sldLayoutId id="2147483656" r:id="rId5"/>
+    <p:sldLayoutId id="2147483654" r:id="rId6"/>
     <p:sldLayoutId id="2147483655" r:id="rId7"/>
+    <p:sldLayoutId id="2147483651" r:id="rId8"/>
   </p:sldLayoutIdLst>
   <p:txStyles>
     <p:titleStyle>
@@ -2997,7 +3619,7 @@
           <a:spcPct val="0"/>
         </a:spcBef>
         <a:buNone/>
-        <a:defRPr sz="3300" kern="1200">
+        <a:defRPr sz="2800" kern="1200">
           <a:solidFill>
             <a:schemeClr val="tx1"/>
           </a:solidFill>
@@ -3014,7 +3636,7 @@
         </a:spcBef>
         <a:buFont typeface="Arial"/>
         <a:buChar char="•"/>
-        <a:defRPr sz="2400" kern="1200">
+        <a:defRPr sz="2000" kern="1200">
           <a:solidFill>
             <a:schemeClr val="tx1"/>
           </a:solidFill>
@@ -3029,7 +3651,7 @@
         </a:spcBef>
         <a:buFont typeface="Arial"/>
         <a:buChar char="–"/>
-        <a:defRPr sz="2100" kern="1200">
+        <a:defRPr sz="2000" kern="1200">
           <a:solidFill>
             <a:schemeClr val="tx1"/>
           </a:solidFill>
@@ -3044,7 +3666,7 @@
         </a:spcBef>
         <a:buFont typeface="Arial"/>
         <a:buChar char="•"/>
-        <a:defRPr sz="1800" kern="1200">
+        <a:defRPr sz="1600" kern="1200">
           <a:solidFill>
             <a:schemeClr val="tx1"/>
           </a:solidFill>
@@ -3059,7 +3681,7 @@
         </a:spcBef>
         <a:buFont typeface="Arial"/>
         <a:buChar char="–"/>
-        <a:defRPr sz="1500" kern="1200">
+        <a:defRPr sz="1400" kern="1200">
           <a:solidFill>
             <a:schemeClr val="tx1"/>
           </a:solidFill>
@@ -3074,7 +3696,7 @@
         </a:spcBef>
         <a:buFont typeface="Arial"/>
         <a:buChar char="»"/>
-        <a:defRPr sz="1500" kern="1200">
+        <a:defRPr sz="1400" kern="1200">
           <a:solidFill>
             <a:schemeClr val="tx1"/>
           </a:solidFill>
@@ -3262,13 +3884,7 @@
       </p:grpSpPr>
       <p:sp>
         <p:nvSpPr>
-          <p:cNvPr id="2" name="Title 1">
-            <a:extLst>
-              <a:ext uri="{FF2B5EF4-FFF2-40B4-BE49-F238E27FC236}">
-                <a16:creationId xmlns:a16="http://schemas.microsoft.com/office/drawing/2014/main" id="{C1C3D938-9998-9FF7-7E7F-EB908A5F5A30}"/>
-              </a:ext>
-            </a:extLst>
-          </p:cNvPr>
+          <p:cNvPr id="2" name="Title 1"/>
           <p:cNvSpPr>
             <a:spLocks noGrp="1"/>
           </p:cNvSpPr>
@@ -3276,29 +3892,21 @@
             <p:ph type="ctrTitle"/>
           </p:nvPr>
         </p:nvSpPr>
-        <p:spPr>
-          <a:xfrm>
-            <a:off x="232200" y="1209601"/>
-            <a:ext cx="4548600" cy="1262699"/>
-          </a:xfrm>
-        </p:spPr>
+        <p:spPr/>
         <p:txBody>
           <a:bodyPr/>
           <a:lstStyle/>
           <a:p>
-            <a:endParaRPr lang="en-GB"/>
-          </a:p>
-        </p:txBody>
-      </p:sp>
-      <p:sp>
-        <p:nvSpPr>
-          <p:cNvPr id="3" name="Subtitle 2">
-            <a:extLst>
-              <a:ext uri="{FF2B5EF4-FFF2-40B4-BE49-F238E27FC236}">
-                <a16:creationId xmlns:a16="http://schemas.microsoft.com/office/drawing/2014/main" id="{D9386DEE-7C7D-95DD-3903-41BDC8D3F50D}"/>
-              </a:ext>
-            </a:extLst>
-          </p:cNvPr>
+            <a:r>
+              <a:rPr lang="en-US" dirty="0"/>
+              <a:t>Presentation Title</a:t>
+            </a:r>
+          </a:p>
+        </p:txBody>
+      </p:sp>
+      <p:sp>
+        <p:nvSpPr>
+          <p:cNvPr id="3" name="Subtitle 2"/>
           <p:cNvSpPr>
             <a:spLocks noGrp="1"/>
           </p:cNvSpPr>
@@ -3306,24 +3914,281 @@
             <p:ph type="subTitle" idx="1"/>
           </p:nvPr>
         </p:nvSpPr>
-        <p:spPr>
-          <a:xfrm>
-            <a:off x="232200" y="2548800"/>
-            <a:ext cx="4296600" cy="892800"/>
-          </a:xfrm>
-        </p:spPr>
+        <p:spPr/>
         <p:txBody>
           <a:bodyPr/>
           <a:lstStyle/>
           <a:p>
-            <a:endParaRPr lang="en-GB" dirty="0"/>
+            <a:r>
+              <a:rPr lang="en-US" dirty="0"/>
+              <a:t>Presentation Subtitle</a:t>
+            </a:r>
           </a:p>
         </p:txBody>
       </p:sp>
     </p:spTree>
     <p:extLst>
       <p:ext uri="{BB962C8B-B14F-4D97-AF65-F5344CB8AC3E}">
-        <p14:creationId xmlns:p14="http://schemas.microsoft.com/office/powerpoint/2010/main" val="67436750"/>
+        <p14:creationId xmlns:p14="http://schemas.microsoft.com/office/powerpoint/2010/main" val="392669009"/>
+      </p:ext>
+    </p:extLst>
+  </p:cSld>
+  <p:clrMapOvr>
+    <a:masterClrMapping/>
+  </p:clrMapOvr>
+</p:sld>
+</file>
+
+<file path=ppt/slides/slide2.xml><?xml version="1.0" encoding="utf-8"?>
+<p:sld xmlns:a="http://schemas.openxmlformats.org/drawingml/2006/main" xmlns:r="http://schemas.openxmlformats.org/officeDocument/2006/relationships" xmlns:p="http://schemas.openxmlformats.org/presentationml/2006/main">
+  <p:cSld>
+    <p:spTree>
+      <p:nvGrpSpPr>
+        <p:cNvPr id="1" name=""/>
+        <p:cNvGrpSpPr/>
+        <p:nvPr/>
+      </p:nvGrpSpPr>
+      <p:grpSpPr>
+        <a:xfrm>
+          <a:off x="0" y="0"/>
+          <a:ext cx="0" cy="0"/>
+          <a:chOff x="0" y="0"/>
+          <a:chExt cx="0" cy="0"/>
+        </a:xfrm>
+      </p:grpSpPr>
+      <p:sp>
+        <p:nvSpPr>
+          <p:cNvPr id="2" name="Title 1"/>
+          <p:cNvSpPr>
+            <a:spLocks noGrp="1"/>
+          </p:cNvSpPr>
+          <p:nvPr>
+            <p:ph type="title"/>
+          </p:nvPr>
+        </p:nvSpPr>
+        <p:spPr/>
+        <p:txBody>
+          <a:bodyPr/>
+          <a:lstStyle/>
+          <a:p>
+            <a:r>
+              <a:rPr lang="en-US" dirty="0"/>
+              <a:t>Slide Title</a:t>
+            </a:r>
+          </a:p>
+        </p:txBody>
+      </p:sp>
+      <p:sp>
+        <p:nvSpPr>
+          <p:cNvPr id="3" name="Content Placeholder 2"/>
+          <p:cNvSpPr>
+            <a:spLocks noGrp="1"/>
+          </p:cNvSpPr>
+          <p:nvPr>
+            <p:ph idx="1"/>
+          </p:nvPr>
+        </p:nvSpPr>
+        <p:spPr/>
+        <p:txBody>
+          <a:bodyPr/>
+          <a:lstStyle/>
+          <a:p>
+            <a:pPr marL="0" indent="0">
+              <a:buNone/>
+            </a:pPr>
+            <a:r>
+              <a:rPr lang="en-US" dirty="0"/>
+              <a:t>Hello</a:t>
+            </a:r>
+            <a:r>
+              <a:rPr lang="en-US"/>
+              <a:t>, world.</a:t>
+            </a:r>
+          </a:p>
+        </p:txBody>
+      </p:sp>
+    </p:spTree>
+    <p:extLst>
+      <p:ext uri="{BB962C8B-B14F-4D97-AF65-F5344CB8AC3E}">
+        <p14:creationId xmlns:p14="http://schemas.microsoft.com/office/powerpoint/2010/main" val="572707455"/>
+      </p:ext>
+    </p:extLst>
+  </p:cSld>
+  <p:clrMapOvr>
+    <a:masterClrMapping/>
+  </p:clrMapOvr>
+</p:sld>
+</file>
+
+<file path=ppt/slides/slide3.xml><?xml version="1.0" encoding="utf-8"?>
+<p:sld xmlns:a="http://schemas.openxmlformats.org/drawingml/2006/main" xmlns:r="http://schemas.openxmlformats.org/officeDocument/2006/relationships" xmlns:p="http://schemas.openxmlformats.org/presentationml/2006/main">
+  <p:cSld>
+    <p:spTree>
+      <p:nvGrpSpPr>
+        <p:cNvPr id="1" name=""/>
+        <p:cNvGrpSpPr/>
+        <p:nvPr/>
+      </p:nvGrpSpPr>
+      <p:grpSpPr>
+        <a:xfrm>
+          <a:off x="0" y="0"/>
+          <a:ext cx="0" cy="0"/>
+          <a:chOff x="0" y="0"/>
+          <a:chExt cx="0" cy="0"/>
+        </a:xfrm>
+      </p:grpSpPr>
+      <p:sp>
+        <p:nvSpPr>
+          <p:cNvPr id="2" name="Title 1"/>
+          <p:cNvSpPr>
+            <a:spLocks noGrp="1"/>
+          </p:cNvSpPr>
+          <p:nvPr>
+            <p:ph type="title"/>
+          </p:nvPr>
+        </p:nvSpPr>
+        <p:spPr/>
+        <p:txBody>
+          <a:bodyPr/>
+          <a:lstStyle/>
+          <a:p>
+            <a:r>
+              <a:rPr lang="en-US" dirty="0"/>
+              <a:t>Section header</a:t>
+            </a:r>
+          </a:p>
+        </p:txBody>
+      </p:sp>
+      <p:sp>
+        <p:nvSpPr>
+          <p:cNvPr id="3" name="Text Placeholder 2"/>
+          <p:cNvSpPr>
+            <a:spLocks noGrp="1"/>
+          </p:cNvSpPr>
+          <p:nvPr>
+            <p:ph type="body" idx="1"/>
+          </p:nvPr>
+        </p:nvSpPr>
+        <p:spPr/>
+        <p:txBody>
+          <a:bodyPr/>
+          <a:lstStyle/>
+          <a:p>
+            <a:endParaRPr lang="en-GB"/>
+          </a:p>
+        </p:txBody>
+      </p:sp>
+    </p:spTree>
+    <p:extLst>
+      <p:ext uri="{BB962C8B-B14F-4D97-AF65-F5344CB8AC3E}">
+        <p14:creationId xmlns:p14="http://schemas.microsoft.com/office/powerpoint/2010/main" val="3996781534"/>
+      </p:ext>
+    </p:extLst>
+  </p:cSld>
+  <p:clrMapOvr>
+    <a:masterClrMapping/>
+  </p:clrMapOvr>
+</p:sld>
+</file>
+
+<file path=ppt/slides/slide4.xml><?xml version="1.0" encoding="utf-8"?>
+<p:sld xmlns:a="http://schemas.openxmlformats.org/drawingml/2006/main" xmlns:r="http://schemas.openxmlformats.org/officeDocument/2006/relationships" xmlns:p="http://schemas.openxmlformats.org/presentationml/2006/main">
+  <p:cSld>
+    <p:spTree>
+      <p:nvGrpSpPr>
+        <p:cNvPr id="1" name=""/>
+        <p:cNvGrpSpPr/>
+        <p:nvPr/>
+      </p:nvGrpSpPr>
+      <p:grpSpPr>
+        <a:xfrm>
+          <a:off x="0" y="0"/>
+          <a:ext cx="0" cy="0"/>
+          <a:chOff x="0" y="0"/>
+          <a:chExt cx="0" cy="0"/>
+        </a:xfrm>
+      </p:grpSpPr>
+      <p:sp>
+        <p:nvSpPr>
+          <p:cNvPr id="4" name="Title 3"/>
+          <p:cNvSpPr>
+            <a:spLocks noGrp="1"/>
+          </p:cNvSpPr>
+          <p:nvPr>
+            <p:ph type="title"/>
+          </p:nvPr>
+        </p:nvSpPr>
+        <p:spPr/>
+        <p:txBody>
+          <a:bodyPr/>
+          <a:lstStyle/>
+          <a:p>
+            <a:r>
+              <a:rPr lang="en-US" dirty="0"/>
+              <a:t>Slide Title for Two-Content</a:t>
+            </a:r>
+          </a:p>
+        </p:txBody>
+      </p:sp>
+      <p:sp>
+        <p:nvSpPr>
+          <p:cNvPr id="5" name="Content Placeholder 4"/>
+          <p:cNvSpPr>
+            <a:spLocks noGrp="1"/>
+          </p:cNvSpPr>
+          <p:nvPr>
+            <p:ph sz="half" idx="1"/>
+          </p:nvPr>
+        </p:nvSpPr>
+        <p:spPr/>
+        <p:txBody>
+          <a:bodyPr/>
+          <a:lstStyle/>
+          <a:p>
+            <a:r>
+              <a:rPr lang="en-US" dirty="0"/>
+              <a:t>Some content on </a:t>
+            </a:r>
+            <a:r>
+              <a:rPr lang="en-US"/>
+              <a:t>the left.</a:t>
+            </a:r>
+            <a:endParaRPr lang="en-US" dirty="0"/>
+          </a:p>
+          <a:p>
+            <a:pPr marL="0" indent="0">
+              <a:buNone/>
+            </a:pPr>
+            <a:endParaRPr lang="en-US" dirty="0"/>
+          </a:p>
+        </p:txBody>
+      </p:sp>
+      <p:sp>
+        <p:nvSpPr>
+          <p:cNvPr id="6" name="Content Placeholder 5"/>
+          <p:cNvSpPr>
+            <a:spLocks noGrp="1"/>
+          </p:cNvSpPr>
+          <p:nvPr>
+            <p:ph sz="half" idx="2"/>
+          </p:nvPr>
+        </p:nvSpPr>
+        <p:spPr/>
+        <p:txBody>
+          <a:bodyPr/>
+          <a:lstStyle/>
+          <a:p>
+            <a:r>
+              <a:rPr lang="en-US" dirty="0"/>
+              <a:t>Some content on the right.</a:t>
+            </a:r>
+          </a:p>
+        </p:txBody>
+      </p:sp>
+    </p:spTree>
+    <p:extLst>
+      <p:ext uri="{BB962C8B-B14F-4D97-AF65-F5344CB8AC3E}">
+        <p14:creationId xmlns:p14="http://schemas.microsoft.com/office/powerpoint/2010/main" val="1324621109"/>
       </p:ext>
     </p:extLst>
   </p:cSld>

</xml_diff>

<commit_message>
Update templates and move example docs to separate branch
</commit_message>
<xml_diff>
--- a/_extensions/jgi/reference-doc.pptx
+++ b/_extensions/jgi/reference-doc.pptx
@@ -211,7 +211,7 @@
           <a:p>
             <a:fld id="{0F9C1CCF-B725-44A7-AA57-5E433BD85C9F}" type="datetimeFigureOut">
               <a:rPr lang="en-US" smtClean="0"/>
-              <a:t>7/1/2024</a:t>
+              <a:t>11/21/2025</a:t>
             </a:fld>
             <a:endParaRPr lang="en-US"/>
           </a:p>
@@ -527,23 +527,6 @@
           <a:bodyPr/>
           <a:lstStyle/>
           <a:p>
-            <a:r>
-              <a:rPr lang="en-US" dirty="0"/>
-              <a:t>Here</a:t>
-            </a:r>
-            <a:r>
-              <a:rPr lang="en-US" baseline="0" dirty="0"/>
-              <a:t> is a note</a:t>
-            </a:r>
-          </a:p>
-          <a:p>
-            <a:endParaRPr lang="en-US" baseline="0" dirty="0"/>
-          </a:p>
-          <a:p>
-            <a:r>
-              <a:rPr lang="en-US" baseline="0" dirty="0"/>
-              <a:t>With another paragraph.</a:t>
-            </a:r>
             <a:endParaRPr lang="en-US" dirty="0"/>
           </a:p>
         </p:txBody>
@@ -633,19 +616,7 @@
           <a:bodyPr/>
           <a:lstStyle/>
           <a:p>
-            <a:r>
-              <a:rPr lang="en-US" dirty="0"/>
-              <a:t>A</a:t>
-            </a:r>
-            <a:r>
-              <a:rPr lang="en-US" baseline="0" dirty="0"/>
-              <a:t> speaker note on </a:t>
-            </a:r>
-            <a:r>
-              <a:rPr lang="en-US" baseline="0"/>
-              <a:t>this slide too.</a:t>
-            </a:r>
-            <a:endParaRPr lang="en-US"/>
+            <a:endParaRPr lang="en-US" dirty="0"/>
           </a:p>
         </p:txBody>
       </p:sp>
@@ -1042,11 +1013,6 @@
             </a:lvl1pPr>
           </a:lstStyle>
           <a:p>
-            <a:fld id="{241EB5C9-1307-BA42-ABA2-0BC069CD8E7F}" type="datetimeFigureOut">
-              <a:rPr lang="en-US" smtClean="0"/>
-              <a:pPr/>
-              <a:t>7/1/2024</a:t>
-            </a:fld>
             <a:endParaRPr lang="en-US" dirty="0"/>
           </a:p>
         </p:txBody>
@@ -1083,121 +1049,169 @@
       </p:grpSpPr>
       <p:sp>
         <p:nvSpPr>
-          <p:cNvPr id="9" name="Freeform 9">
+          <p:cNvPr id="2" name="Title 1"/>
+          <p:cNvSpPr>
+            <a:spLocks noGrp="1"/>
+          </p:cNvSpPr>
+          <p:nvPr>
+            <p:ph type="title"/>
+          </p:nvPr>
+        </p:nvSpPr>
+        <p:spPr/>
+        <p:txBody>
+          <a:bodyPr/>
+          <a:lstStyle>
+            <a:lvl1pPr>
+              <a:defRPr>
+                <a:solidFill>
+                  <a:schemeClr val="accent6"/>
+                </a:solidFill>
+              </a:defRPr>
+            </a:lvl1pPr>
+          </a:lstStyle>
+          <a:p>
+            <a:r>
+              <a:rPr lang="en-US" dirty="0"/>
+              <a:t>Click to edit Master title style</a:t>
+            </a:r>
+          </a:p>
+        </p:txBody>
+      </p:sp>
+      <p:sp>
+        <p:nvSpPr>
+          <p:cNvPr id="3" name="Content Placeholder 2"/>
+          <p:cNvSpPr>
+            <a:spLocks noGrp="1"/>
+          </p:cNvSpPr>
+          <p:nvPr>
+            <p:ph idx="1"/>
+          </p:nvPr>
+        </p:nvSpPr>
+        <p:spPr>
+          <a:xfrm>
+            <a:off x="201600" y="959796"/>
+            <a:ext cx="8740800" cy="3619243"/>
+          </a:xfrm>
+        </p:spPr>
+        <p:txBody>
+          <a:bodyPr/>
+          <a:lstStyle/>
+          <a:p>
+            <a:pPr lvl="0"/>
+            <a:r>
+              <a:rPr lang="en-US" dirty="0"/>
+              <a:t>Click to edit Master text styles</a:t>
+            </a:r>
+          </a:p>
+          <a:p>
+            <a:pPr lvl="1"/>
+            <a:r>
+              <a:rPr lang="en-US" dirty="0"/>
+              <a:t>Second level</a:t>
+            </a:r>
+          </a:p>
+          <a:p>
+            <a:pPr lvl="2"/>
+            <a:r>
+              <a:rPr lang="en-US" dirty="0"/>
+              <a:t>Third level</a:t>
+            </a:r>
+          </a:p>
+          <a:p>
+            <a:pPr lvl="3"/>
+            <a:r>
+              <a:rPr lang="en-US" dirty="0"/>
+              <a:t>Fourth level</a:t>
+            </a:r>
+          </a:p>
+          <a:p>
+            <a:pPr lvl="4"/>
+            <a:r>
+              <a:rPr lang="en-US" dirty="0"/>
+              <a:t>Fifth level</a:t>
+            </a:r>
+          </a:p>
+        </p:txBody>
+      </p:sp>
+      <p:sp>
+        <p:nvSpPr>
+          <p:cNvPr id="4" name="Date Placeholder 3"/>
+          <p:cNvSpPr>
+            <a:spLocks noGrp="1"/>
+          </p:cNvSpPr>
+          <p:nvPr>
+            <p:ph type="dt" sz="half" idx="10"/>
+          </p:nvPr>
+        </p:nvSpPr>
+        <p:spPr/>
+        <p:txBody>
+          <a:bodyPr/>
+          <a:lstStyle/>
+          <a:p>
+            <a:fld id="{241EB5C9-1307-BA42-ABA2-0BC069CD8E7F}" type="datetimeFigureOut">
+              <a:rPr lang="en-US" smtClean="0"/>
+              <a:t>11/21/2025</a:t>
+            </a:fld>
+            <a:endParaRPr lang="en-US"/>
+          </a:p>
+        </p:txBody>
+      </p:sp>
+      <p:sp>
+        <p:nvSpPr>
+          <p:cNvPr id="5" name="Footer Placeholder 4"/>
+          <p:cNvSpPr>
+            <a:spLocks noGrp="1"/>
+          </p:cNvSpPr>
+          <p:nvPr>
+            <p:ph type="ftr" sz="quarter" idx="11"/>
+          </p:nvPr>
+        </p:nvSpPr>
+        <p:spPr/>
+        <p:txBody>
+          <a:bodyPr/>
+          <a:lstStyle/>
+          <a:p>
+            <a:endParaRPr lang="en-US"/>
+          </a:p>
+        </p:txBody>
+      </p:sp>
+      <p:sp>
+        <p:nvSpPr>
+          <p:cNvPr id="6" name="Slide Number Placeholder 5"/>
+          <p:cNvSpPr>
+            <a:spLocks noGrp="1"/>
+          </p:cNvSpPr>
+          <p:nvPr>
+            <p:ph type="sldNum" sz="quarter" idx="12"/>
+          </p:nvPr>
+        </p:nvSpPr>
+        <p:spPr>
+          <a:xfrm>
+            <a:off x="6553200" y="4767263"/>
+            <a:ext cx="1416996" cy="273844"/>
+          </a:xfrm>
+        </p:spPr>
+        <p:txBody>
+          <a:bodyPr/>
+          <a:lstStyle/>
+          <a:p>
+            <a:fld id="{C5EF2332-01BF-834F-8236-50238282D533}" type="slidenum">
+              <a:rPr lang="en-US" smtClean="0"/>
+              <a:t>‹#›</a:t>
+            </a:fld>
+            <a:endParaRPr lang="en-US"/>
+          </a:p>
+        </p:txBody>
+      </p:sp>
+      <p:pic>
+        <p:nvPicPr>
+          <p:cNvPr id="7" name="Graphic 6" descr="Jean Golding Institute, University of Bristol">
             <a:extLst>
               <a:ext uri="{FF2B5EF4-FFF2-40B4-BE49-F238E27FC236}">
-                <a16:creationId xmlns:a16="http://schemas.microsoft.com/office/drawing/2014/main" id="{A4D20132-BDE7-D35A-BA8B-593727A0D781}"/>
+                <a16:creationId xmlns:a16="http://schemas.microsoft.com/office/drawing/2014/main" id="{FE28C1DB-F305-64F0-0E19-26CC50D5D762}"/>
               </a:ext>
               <a:ext uri="{C183D7F6-B498-43B3-948B-1728B52AA6E4}">
-                <adec:decorative xmlns:adec="http://schemas.microsoft.com/office/drawing/2017/decorative" val="1"/>
-              </a:ext>
-            </a:extLst>
-          </p:cNvPr>
-          <p:cNvSpPr/>
-          <p:nvPr userDrawn="1"/>
-        </p:nvSpPr>
-        <p:spPr>
-          <a:xfrm>
-            <a:off x="-9236" y="0"/>
-            <a:ext cx="6031345" cy="1006763"/>
-          </a:xfrm>
-          <a:custGeom>
-            <a:avLst/>
-            <a:gdLst>
-              <a:gd name="connsiteX0" fmla="*/ 9236 w 6031345"/>
-              <a:gd name="connsiteY0" fmla="*/ 0 h 1006763"/>
-              <a:gd name="connsiteX1" fmla="*/ 6031345 w 6031345"/>
-              <a:gd name="connsiteY1" fmla="*/ 0 h 1006763"/>
-              <a:gd name="connsiteX2" fmla="*/ 5800436 w 6031345"/>
-              <a:gd name="connsiteY2" fmla="*/ 1006763 h 1006763"/>
-              <a:gd name="connsiteX3" fmla="*/ 0 w 6031345"/>
-              <a:gd name="connsiteY3" fmla="*/ 1006763 h 1006763"/>
-              <a:gd name="connsiteX4" fmla="*/ 9236 w 6031345"/>
-              <a:gd name="connsiteY4" fmla="*/ 0 h 1006763"/>
-            </a:gdLst>
-            <a:ahLst/>
-            <a:cxnLst>
-              <a:cxn ang="0">
-                <a:pos x="connsiteX0" y="connsiteY0"/>
-              </a:cxn>
-              <a:cxn ang="0">
-                <a:pos x="connsiteX1" y="connsiteY1"/>
-              </a:cxn>
-              <a:cxn ang="0">
-                <a:pos x="connsiteX2" y="connsiteY2"/>
-              </a:cxn>
-              <a:cxn ang="0">
-                <a:pos x="connsiteX3" y="connsiteY3"/>
-              </a:cxn>
-              <a:cxn ang="0">
-                <a:pos x="connsiteX4" y="connsiteY4"/>
-              </a:cxn>
-            </a:cxnLst>
-            <a:rect l="l" t="t" r="r" b="b"/>
-            <a:pathLst>
-              <a:path w="6031345" h="1006763">
-                <a:moveTo>
-                  <a:pt x="9236" y="0"/>
-                </a:moveTo>
-                <a:lnTo>
-                  <a:pt x="6031345" y="0"/>
-                </a:lnTo>
-                <a:lnTo>
-                  <a:pt x="5800436" y="1006763"/>
-                </a:lnTo>
-                <a:lnTo>
-                  <a:pt x="0" y="1006763"/>
-                </a:lnTo>
-                <a:cubicBezTo>
-                  <a:pt x="3079" y="671175"/>
-                  <a:pt x="6157" y="335588"/>
-                  <a:pt x="9236" y="0"/>
-                </a:cubicBezTo>
-                <a:close/>
-              </a:path>
-            </a:pathLst>
-          </a:custGeom>
-          <a:solidFill>
-            <a:srgbClr val="E1239A"/>
-          </a:solidFill>
-          <a:ln>
-            <a:noFill/>
-          </a:ln>
-        </p:spPr>
-        <p:style>
-          <a:lnRef idx="2">
-            <a:schemeClr val="accent1">
-              <a:shade val="50000"/>
-            </a:schemeClr>
-          </a:lnRef>
-          <a:fillRef idx="1">
-            <a:schemeClr val="accent1"/>
-          </a:fillRef>
-          <a:effectRef idx="0">
-            <a:schemeClr val="accent1"/>
-          </a:effectRef>
-          <a:fontRef idx="minor">
-            <a:schemeClr val="lt1"/>
-          </a:fontRef>
-        </p:style>
-        <p:txBody>
-          <a:bodyPr rtlCol="0" anchor="ctr"/>
-          <a:lstStyle/>
-          <a:p>
-            <a:pPr algn="ctr"/>
-            <a:endParaRPr lang="en-US"/>
-          </a:p>
-        </p:txBody>
-      </p:sp>
-      <p:pic>
-        <p:nvPicPr>
-          <p:cNvPr id="10" name="Picture 9">
-            <a:extLst>
-              <a:ext uri="{FF2B5EF4-FFF2-40B4-BE49-F238E27FC236}">
-                <a16:creationId xmlns:a16="http://schemas.microsoft.com/office/drawing/2014/main" id="{9EB38BA9-7090-F776-361A-7BFBECDD60F9}"/>
-              </a:ext>
-              <a:ext uri="{C183D7F6-B498-43B3-948B-1728B52AA6E4}">
-                <adec:decorative xmlns:adec="http://schemas.microsoft.com/office/drawing/2017/decorative" val="1"/>
+                <adec:decorative xmlns:adec="http://schemas.microsoft.com/office/drawing/2017/decorative" val="0"/>
               </a:ext>
             </a:extLst>
           </p:cNvPr>
@@ -1207,166 +1221,29 @@
           <p:nvPr userDrawn="1"/>
         </p:nvPicPr>
         <p:blipFill>
-          <a:blip r:embed="rId2"/>
+          <a:blip r:embed="rId2" cstate="screen">
+            <a:extLst>
+              <a:ext uri="{28A0092B-C50C-407E-A947-70E740481C1C}">
+                <a14:useLocalDpi xmlns:a14="http://schemas.microsoft.com/office/drawing/2010/main"/>
+              </a:ext>
+              <a:ext uri="{96DAC541-7B7A-43D3-8B79-37D633B846F1}">
+                <asvg:svgBlip xmlns:asvg="http://schemas.microsoft.com/office/drawing/2016/SVG/main" r:embed="rId3"/>
+              </a:ext>
+            </a:extLst>
+          </a:blip>
           <a:srcRect/>
           <a:stretch/>
         </p:blipFill>
         <p:spPr>
           <a:xfrm>
-            <a:off x="7830787" y="261"/>
-            <a:ext cx="1257270" cy="1269477"/>
+            <a:off x="8054502" y="4636036"/>
+            <a:ext cx="975121" cy="403313"/>
           </a:xfrm>
           <a:prstGeom prst="rect">
             <a:avLst/>
           </a:prstGeom>
         </p:spPr>
       </p:pic>
-      <p:sp>
-        <p:nvSpPr>
-          <p:cNvPr id="2" name="Title 1"/>
-          <p:cNvSpPr>
-            <a:spLocks noGrp="1"/>
-          </p:cNvSpPr>
-          <p:nvPr>
-            <p:ph type="title"/>
-          </p:nvPr>
-        </p:nvSpPr>
-        <p:spPr/>
-        <p:txBody>
-          <a:bodyPr/>
-          <a:lstStyle>
-            <a:lvl1pPr>
-              <a:defRPr>
-                <a:solidFill>
-                  <a:schemeClr val="bg1"/>
-                </a:solidFill>
-              </a:defRPr>
-            </a:lvl1pPr>
-          </a:lstStyle>
-          <a:p>
-            <a:r>
-              <a:rPr lang="en-US" dirty="0"/>
-              <a:t>Click to edit Master title style</a:t>
-            </a:r>
-          </a:p>
-        </p:txBody>
-      </p:sp>
-      <p:sp>
-        <p:nvSpPr>
-          <p:cNvPr id="3" name="Content Placeholder 2"/>
-          <p:cNvSpPr>
-            <a:spLocks noGrp="1"/>
-          </p:cNvSpPr>
-          <p:nvPr>
-            <p:ph idx="1"/>
-          </p:nvPr>
-        </p:nvSpPr>
-        <p:spPr/>
-        <p:txBody>
-          <a:bodyPr/>
-          <a:lstStyle/>
-          <a:p>
-            <a:pPr lvl="0"/>
-            <a:r>
-              <a:rPr lang="en-US" dirty="0"/>
-              <a:t>Click to edit Master text styles</a:t>
-            </a:r>
-          </a:p>
-          <a:p>
-            <a:pPr lvl="1"/>
-            <a:r>
-              <a:rPr lang="en-US" dirty="0"/>
-              <a:t>Second level</a:t>
-            </a:r>
-          </a:p>
-          <a:p>
-            <a:pPr lvl="2"/>
-            <a:r>
-              <a:rPr lang="en-US" dirty="0"/>
-              <a:t>Third level</a:t>
-            </a:r>
-          </a:p>
-          <a:p>
-            <a:pPr lvl="3"/>
-            <a:r>
-              <a:rPr lang="en-US" dirty="0"/>
-              <a:t>Fourth level</a:t>
-            </a:r>
-          </a:p>
-          <a:p>
-            <a:pPr lvl="4"/>
-            <a:r>
-              <a:rPr lang="en-US" dirty="0"/>
-              <a:t>Fifth level</a:t>
-            </a:r>
-          </a:p>
-        </p:txBody>
-      </p:sp>
-      <p:sp>
-        <p:nvSpPr>
-          <p:cNvPr id="4" name="Date Placeholder 3"/>
-          <p:cNvSpPr>
-            <a:spLocks noGrp="1"/>
-          </p:cNvSpPr>
-          <p:nvPr>
-            <p:ph type="dt" sz="half" idx="10"/>
-          </p:nvPr>
-        </p:nvSpPr>
-        <p:spPr/>
-        <p:txBody>
-          <a:bodyPr/>
-          <a:lstStyle/>
-          <a:p>
-            <a:fld id="{241EB5C9-1307-BA42-ABA2-0BC069CD8E7F}" type="datetimeFigureOut">
-              <a:rPr lang="en-US" smtClean="0"/>
-              <a:t>7/1/2024</a:t>
-            </a:fld>
-            <a:endParaRPr lang="en-US"/>
-          </a:p>
-        </p:txBody>
-      </p:sp>
-      <p:sp>
-        <p:nvSpPr>
-          <p:cNvPr id="5" name="Footer Placeholder 4"/>
-          <p:cNvSpPr>
-            <a:spLocks noGrp="1"/>
-          </p:cNvSpPr>
-          <p:nvPr>
-            <p:ph type="ftr" sz="quarter" idx="11"/>
-          </p:nvPr>
-        </p:nvSpPr>
-        <p:spPr/>
-        <p:txBody>
-          <a:bodyPr/>
-          <a:lstStyle/>
-          <a:p>
-            <a:endParaRPr lang="en-US"/>
-          </a:p>
-        </p:txBody>
-      </p:sp>
-      <p:sp>
-        <p:nvSpPr>
-          <p:cNvPr id="6" name="Slide Number Placeholder 5"/>
-          <p:cNvSpPr>
-            <a:spLocks noGrp="1"/>
-          </p:cNvSpPr>
-          <p:nvPr>
-            <p:ph type="sldNum" sz="quarter" idx="12"/>
-          </p:nvPr>
-        </p:nvSpPr>
-        <p:spPr/>
-        <p:txBody>
-          <a:bodyPr/>
-          <a:lstStyle/>
-          <a:p>
-            <a:fld id="{C5EF2332-01BF-834F-8236-50238282D533}" type="slidenum">
-              <a:rPr lang="en-US" smtClean="0"/>
-              <a:t>‹#›</a:t>
-            </a:fld>
-            <a:endParaRPr lang="en-US"/>
-          </a:p>
-        </p:txBody>
-      </p:sp>
     </p:spTree>
     <p:extLst>
       <p:ext uri="{BB962C8B-B14F-4D97-AF65-F5344CB8AC3E}">
@@ -1399,146 +1276,6 @@
       </p:grpSpPr>
       <p:sp>
         <p:nvSpPr>
-          <p:cNvPr id="8" name="Freeform 9">
-            <a:extLst>
-              <a:ext uri="{FF2B5EF4-FFF2-40B4-BE49-F238E27FC236}">
-                <a16:creationId xmlns:a16="http://schemas.microsoft.com/office/drawing/2014/main" id="{08A8EB7F-D923-FDC0-FE22-EE79744B02C6}"/>
-              </a:ext>
-              <a:ext uri="{C183D7F6-B498-43B3-948B-1728B52AA6E4}">
-                <adec:decorative xmlns:adec="http://schemas.microsoft.com/office/drawing/2017/decorative" val="1"/>
-              </a:ext>
-            </a:extLst>
-          </p:cNvPr>
-          <p:cNvSpPr/>
-          <p:nvPr userDrawn="1"/>
-        </p:nvSpPr>
-        <p:spPr>
-          <a:xfrm>
-            <a:off x="-9236" y="0"/>
-            <a:ext cx="6031345" cy="1006763"/>
-          </a:xfrm>
-          <a:custGeom>
-            <a:avLst/>
-            <a:gdLst>
-              <a:gd name="connsiteX0" fmla="*/ 9236 w 6031345"/>
-              <a:gd name="connsiteY0" fmla="*/ 0 h 1006763"/>
-              <a:gd name="connsiteX1" fmla="*/ 6031345 w 6031345"/>
-              <a:gd name="connsiteY1" fmla="*/ 0 h 1006763"/>
-              <a:gd name="connsiteX2" fmla="*/ 5800436 w 6031345"/>
-              <a:gd name="connsiteY2" fmla="*/ 1006763 h 1006763"/>
-              <a:gd name="connsiteX3" fmla="*/ 0 w 6031345"/>
-              <a:gd name="connsiteY3" fmla="*/ 1006763 h 1006763"/>
-              <a:gd name="connsiteX4" fmla="*/ 9236 w 6031345"/>
-              <a:gd name="connsiteY4" fmla="*/ 0 h 1006763"/>
-            </a:gdLst>
-            <a:ahLst/>
-            <a:cxnLst>
-              <a:cxn ang="0">
-                <a:pos x="connsiteX0" y="connsiteY0"/>
-              </a:cxn>
-              <a:cxn ang="0">
-                <a:pos x="connsiteX1" y="connsiteY1"/>
-              </a:cxn>
-              <a:cxn ang="0">
-                <a:pos x="connsiteX2" y="connsiteY2"/>
-              </a:cxn>
-              <a:cxn ang="0">
-                <a:pos x="connsiteX3" y="connsiteY3"/>
-              </a:cxn>
-              <a:cxn ang="0">
-                <a:pos x="connsiteX4" y="connsiteY4"/>
-              </a:cxn>
-            </a:cxnLst>
-            <a:rect l="l" t="t" r="r" b="b"/>
-            <a:pathLst>
-              <a:path w="6031345" h="1006763">
-                <a:moveTo>
-                  <a:pt x="9236" y="0"/>
-                </a:moveTo>
-                <a:lnTo>
-                  <a:pt x="6031345" y="0"/>
-                </a:lnTo>
-                <a:lnTo>
-                  <a:pt x="5800436" y="1006763"/>
-                </a:lnTo>
-                <a:lnTo>
-                  <a:pt x="0" y="1006763"/>
-                </a:lnTo>
-                <a:cubicBezTo>
-                  <a:pt x="3079" y="671175"/>
-                  <a:pt x="6157" y="335588"/>
-                  <a:pt x="9236" y="0"/>
-                </a:cubicBezTo>
-                <a:close/>
-              </a:path>
-            </a:pathLst>
-          </a:custGeom>
-          <a:solidFill>
-            <a:srgbClr val="E1239A"/>
-          </a:solidFill>
-          <a:ln>
-            <a:noFill/>
-          </a:ln>
-        </p:spPr>
-        <p:style>
-          <a:lnRef idx="2">
-            <a:schemeClr val="accent1">
-              <a:shade val="50000"/>
-            </a:schemeClr>
-          </a:lnRef>
-          <a:fillRef idx="1">
-            <a:schemeClr val="accent1"/>
-          </a:fillRef>
-          <a:effectRef idx="0">
-            <a:schemeClr val="accent1"/>
-          </a:effectRef>
-          <a:fontRef idx="minor">
-            <a:schemeClr val="lt1"/>
-          </a:fontRef>
-        </p:style>
-        <p:txBody>
-          <a:bodyPr rtlCol="0" anchor="ctr"/>
-          <a:lstStyle/>
-          <a:p>
-            <a:pPr algn="ctr"/>
-            <a:endParaRPr lang="en-US"/>
-          </a:p>
-        </p:txBody>
-      </p:sp>
-      <p:pic>
-        <p:nvPicPr>
-          <p:cNvPr id="9" name="Picture 8">
-            <a:extLst>
-              <a:ext uri="{FF2B5EF4-FFF2-40B4-BE49-F238E27FC236}">
-                <a16:creationId xmlns:a16="http://schemas.microsoft.com/office/drawing/2014/main" id="{489145EC-81E6-8393-F9B9-866990E31E65}"/>
-              </a:ext>
-              <a:ext uri="{C183D7F6-B498-43B3-948B-1728B52AA6E4}">
-                <adec:decorative xmlns:adec="http://schemas.microsoft.com/office/drawing/2017/decorative" val="1"/>
-              </a:ext>
-            </a:extLst>
-          </p:cNvPr>
-          <p:cNvPicPr>
-            <a:picLocks noChangeAspect="1"/>
-          </p:cNvPicPr>
-          <p:nvPr userDrawn="1"/>
-        </p:nvPicPr>
-        <p:blipFill>
-          <a:blip r:embed="rId2"/>
-          <a:srcRect/>
-          <a:stretch/>
-        </p:blipFill>
-        <p:spPr>
-          <a:xfrm>
-            <a:off x="7830787" y="261"/>
-            <a:ext cx="1257270" cy="1269477"/>
-          </a:xfrm>
-          <a:prstGeom prst="rect">
-            <a:avLst/>
-          </a:prstGeom>
-        </p:spPr>
-      </p:pic>
-      <p:sp>
-        <p:nvSpPr>
           <p:cNvPr id="2" name="Title 1"/>
           <p:cNvSpPr>
             <a:spLocks noGrp="1"/>
@@ -1557,7 +1294,7 @@
               </a:tabLst>
               <a:defRPr>
                 <a:solidFill>
-                  <a:schemeClr val="bg1"/>
+                  <a:schemeClr val="accent6"/>
                 </a:solidFill>
               </a:defRPr>
             </a:lvl1pPr>
@@ -1582,8 +1319,8 @@
         </p:nvSpPr>
         <p:spPr>
           <a:xfrm>
-            <a:off x="212411" y="1200151"/>
-            <a:ext cx="4283389" cy="3394472"/>
+            <a:off x="212411" y="959797"/>
+            <a:ext cx="4283389" cy="3634826"/>
           </a:xfrm>
         </p:spPr>
         <p:txBody>
@@ -1666,8 +1403,8 @@
         </p:nvSpPr>
         <p:spPr>
           <a:xfrm>
-            <a:off x="4648200" y="1200151"/>
-            <a:ext cx="4294200" cy="3394472"/>
+            <a:off x="4648200" y="959797"/>
+            <a:ext cx="4294200" cy="3634826"/>
           </a:xfrm>
         </p:spPr>
         <p:txBody>
@@ -1755,7 +1492,7 @@
           <a:p>
             <a:fld id="{241EB5C9-1307-BA42-ABA2-0BC069CD8E7F}" type="datetimeFigureOut">
               <a:rPr lang="en-US" smtClean="0"/>
-              <a:t>7/1/2024</a:t>
+              <a:t>11/21/2025</a:t>
             </a:fld>
             <a:endParaRPr lang="en-US"/>
           </a:p>
@@ -1782,7 +1519,13 @@
       </p:sp>
       <p:sp>
         <p:nvSpPr>
-          <p:cNvPr id="7" name="Slide Number Placeholder 6"/>
+          <p:cNvPr id="11" name="Slide Number Placeholder 5">
+            <a:extLst>
+              <a:ext uri="{FF2B5EF4-FFF2-40B4-BE49-F238E27FC236}">
+                <a16:creationId xmlns:a16="http://schemas.microsoft.com/office/drawing/2014/main" id="{BC734E33-D4C2-B2C0-64DF-0776C63DB061}"/>
+              </a:ext>
+            </a:extLst>
+          </p:cNvPr>
           <p:cNvSpPr>
             <a:spLocks noGrp="1"/>
           </p:cNvSpPr>
@@ -1790,7 +1533,12 @@
             <p:ph type="sldNum" sz="quarter" idx="12"/>
           </p:nvPr>
         </p:nvSpPr>
-        <p:spPr/>
+        <p:spPr>
+          <a:xfrm>
+            <a:off x="6553200" y="4767263"/>
+            <a:ext cx="1416996" cy="273844"/>
+          </a:xfrm>
+        </p:spPr>
         <p:txBody>
           <a:bodyPr/>
           <a:lstStyle/>
@@ -1803,6 +1551,47 @@
           </a:p>
         </p:txBody>
       </p:sp>
+      <p:pic>
+        <p:nvPicPr>
+          <p:cNvPr id="15" name="Graphic 14" descr="Jean Golding Institute, University of Bristol">
+            <a:extLst>
+              <a:ext uri="{FF2B5EF4-FFF2-40B4-BE49-F238E27FC236}">
+                <a16:creationId xmlns:a16="http://schemas.microsoft.com/office/drawing/2014/main" id="{41968ECB-3636-687F-8F23-2B72454A5CBB}"/>
+              </a:ext>
+              <a:ext uri="{C183D7F6-B498-43B3-948B-1728B52AA6E4}">
+                <adec:decorative xmlns:adec="http://schemas.microsoft.com/office/drawing/2017/decorative" val="0"/>
+              </a:ext>
+            </a:extLst>
+          </p:cNvPr>
+          <p:cNvPicPr>
+            <a:picLocks noChangeAspect="1"/>
+          </p:cNvPicPr>
+          <p:nvPr userDrawn="1"/>
+        </p:nvPicPr>
+        <p:blipFill>
+          <a:blip r:embed="rId2" cstate="screen">
+            <a:extLst>
+              <a:ext uri="{28A0092B-C50C-407E-A947-70E740481C1C}">
+                <a14:useLocalDpi xmlns:a14="http://schemas.microsoft.com/office/drawing/2010/main"/>
+              </a:ext>
+              <a:ext uri="{96DAC541-7B7A-43D3-8B79-37D633B846F1}">
+                <asvg:svgBlip xmlns:asvg="http://schemas.microsoft.com/office/drawing/2016/SVG/main" r:embed="rId3"/>
+              </a:ext>
+            </a:extLst>
+          </a:blip>
+          <a:srcRect/>
+          <a:stretch/>
+        </p:blipFill>
+        <p:spPr>
+          <a:xfrm>
+            <a:off x="8054502" y="4636036"/>
+            <a:ext cx="975121" cy="403313"/>
+          </a:xfrm>
+          <a:prstGeom prst="rect">
+            <a:avLst/>
+          </a:prstGeom>
+        </p:spPr>
+      </p:pic>
     </p:spTree>
     <p:extLst>
       <p:ext uri="{BB962C8B-B14F-4D97-AF65-F5344CB8AC3E}">
@@ -1835,146 +1624,6 @@
       </p:grpSpPr>
       <p:sp>
         <p:nvSpPr>
-          <p:cNvPr id="10" name="Freeform 9">
-            <a:extLst>
-              <a:ext uri="{FF2B5EF4-FFF2-40B4-BE49-F238E27FC236}">
-                <a16:creationId xmlns:a16="http://schemas.microsoft.com/office/drawing/2014/main" id="{21456DE8-D48B-6C26-B0A6-5C694958E403}"/>
-              </a:ext>
-              <a:ext uri="{C183D7F6-B498-43B3-948B-1728B52AA6E4}">
-                <adec:decorative xmlns:adec="http://schemas.microsoft.com/office/drawing/2017/decorative" val="1"/>
-              </a:ext>
-            </a:extLst>
-          </p:cNvPr>
-          <p:cNvSpPr/>
-          <p:nvPr userDrawn="1"/>
-        </p:nvSpPr>
-        <p:spPr>
-          <a:xfrm>
-            <a:off x="-9236" y="0"/>
-            <a:ext cx="6031345" cy="1006763"/>
-          </a:xfrm>
-          <a:custGeom>
-            <a:avLst/>
-            <a:gdLst>
-              <a:gd name="connsiteX0" fmla="*/ 9236 w 6031345"/>
-              <a:gd name="connsiteY0" fmla="*/ 0 h 1006763"/>
-              <a:gd name="connsiteX1" fmla="*/ 6031345 w 6031345"/>
-              <a:gd name="connsiteY1" fmla="*/ 0 h 1006763"/>
-              <a:gd name="connsiteX2" fmla="*/ 5800436 w 6031345"/>
-              <a:gd name="connsiteY2" fmla="*/ 1006763 h 1006763"/>
-              <a:gd name="connsiteX3" fmla="*/ 0 w 6031345"/>
-              <a:gd name="connsiteY3" fmla="*/ 1006763 h 1006763"/>
-              <a:gd name="connsiteX4" fmla="*/ 9236 w 6031345"/>
-              <a:gd name="connsiteY4" fmla="*/ 0 h 1006763"/>
-            </a:gdLst>
-            <a:ahLst/>
-            <a:cxnLst>
-              <a:cxn ang="0">
-                <a:pos x="connsiteX0" y="connsiteY0"/>
-              </a:cxn>
-              <a:cxn ang="0">
-                <a:pos x="connsiteX1" y="connsiteY1"/>
-              </a:cxn>
-              <a:cxn ang="0">
-                <a:pos x="connsiteX2" y="connsiteY2"/>
-              </a:cxn>
-              <a:cxn ang="0">
-                <a:pos x="connsiteX3" y="connsiteY3"/>
-              </a:cxn>
-              <a:cxn ang="0">
-                <a:pos x="connsiteX4" y="connsiteY4"/>
-              </a:cxn>
-            </a:cxnLst>
-            <a:rect l="l" t="t" r="r" b="b"/>
-            <a:pathLst>
-              <a:path w="6031345" h="1006763">
-                <a:moveTo>
-                  <a:pt x="9236" y="0"/>
-                </a:moveTo>
-                <a:lnTo>
-                  <a:pt x="6031345" y="0"/>
-                </a:lnTo>
-                <a:lnTo>
-                  <a:pt x="5800436" y="1006763"/>
-                </a:lnTo>
-                <a:lnTo>
-                  <a:pt x="0" y="1006763"/>
-                </a:lnTo>
-                <a:cubicBezTo>
-                  <a:pt x="3079" y="671175"/>
-                  <a:pt x="6157" y="335588"/>
-                  <a:pt x="9236" y="0"/>
-                </a:cubicBezTo>
-                <a:close/>
-              </a:path>
-            </a:pathLst>
-          </a:custGeom>
-          <a:solidFill>
-            <a:srgbClr val="E1239A"/>
-          </a:solidFill>
-          <a:ln>
-            <a:noFill/>
-          </a:ln>
-        </p:spPr>
-        <p:style>
-          <a:lnRef idx="2">
-            <a:schemeClr val="accent1">
-              <a:shade val="50000"/>
-            </a:schemeClr>
-          </a:lnRef>
-          <a:fillRef idx="1">
-            <a:schemeClr val="accent1"/>
-          </a:fillRef>
-          <a:effectRef idx="0">
-            <a:schemeClr val="accent1"/>
-          </a:effectRef>
-          <a:fontRef idx="minor">
-            <a:schemeClr val="lt1"/>
-          </a:fontRef>
-        </p:style>
-        <p:txBody>
-          <a:bodyPr rtlCol="0" anchor="ctr"/>
-          <a:lstStyle/>
-          <a:p>
-            <a:pPr algn="ctr"/>
-            <a:endParaRPr lang="en-US"/>
-          </a:p>
-        </p:txBody>
-      </p:sp>
-      <p:pic>
-        <p:nvPicPr>
-          <p:cNvPr id="11" name="Picture 10">
-            <a:extLst>
-              <a:ext uri="{FF2B5EF4-FFF2-40B4-BE49-F238E27FC236}">
-                <a16:creationId xmlns:a16="http://schemas.microsoft.com/office/drawing/2014/main" id="{6B001646-A555-007C-6D0C-559C50C15079}"/>
-              </a:ext>
-              <a:ext uri="{C183D7F6-B498-43B3-948B-1728B52AA6E4}">
-                <adec:decorative xmlns:adec="http://schemas.microsoft.com/office/drawing/2017/decorative" val="1"/>
-              </a:ext>
-            </a:extLst>
-          </p:cNvPr>
-          <p:cNvPicPr>
-            <a:picLocks noChangeAspect="1"/>
-          </p:cNvPicPr>
-          <p:nvPr userDrawn="1"/>
-        </p:nvPicPr>
-        <p:blipFill>
-          <a:blip r:embed="rId2"/>
-          <a:srcRect/>
-          <a:stretch/>
-        </p:blipFill>
-        <p:spPr>
-          <a:xfrm>
-            <a:off x="7830787" y="261"/>
-            <a:ext cx="1257270" cy="1269477"/>
-          </a:xfrm>
-          <a:prstGeom prst="rect">
-            <a:avLst/>
-          </a:prstGeom>
-        </p:spPr>
-      </p:pic>
-      <p:sp>
-        <p:nvSpPr>
           <p:cNvPr id="2" name="Title 1"/>
           <p:cNvSpPr>
             <a:spLocks noGrp="1"/>
@@ -1990,7 +1639,7 @@
             <a:lvl1pPr>
               <a:defRPr>
                 <a:solidFill>
-                  <a:schemeClr val="bg1"/>
+                  <a:schemeClr val="accent6"/>
                 </a:solidFill>
               </a:defRPr>
             </a:lvl1pPr>
@@ -2015,7 +1664,7 @@
         </p:nvSpPr>
         <p:spPr>
           <a:xfrm>
-            <a:off x="201600" y="1151335"/>
+            <a:off x="201600" y="978693"/>
             <a:ext cx="4295788" cy="479822"/>
           </a:xfrm>
         </p:spPr>
@@ -2080,8 +1729,8 @@
         </p:nvSpPr>
         <p:spPr>
           <a:xfrm>
-            <a:off x="201600" y="1631156"/>
-            <a:ext cx="4295788" cy="2963466"/>
+            <a:off x="201600" y="1458515"/>
+            <a:ext cx="4295788" cy="3136107"/>
           </a:xfrm>
         </p:spPr>
         <p:txBody>
@@ -2164,7 +1813,7 @@
         </p:nvSpPr>
         <p:spPr>
           <a:xfrm>
-            <a:off x="4645026" y="1151335"/>
+            <a:off x="4645026" y="978693"/>
             <a:ext cx="4295788" cy="479822"/>
           </a:xfrm>
         </p:spPr>
@@ -2229,8 +1878,8 @@
         </p:nvSpPr>
         <p:spPr>
           <a:xfrm>
-            <a:off x="4645026" y="1631156"/>
-            <a:ext cx="4295788" cy="2963466"/>
+            <a:off x="4645026" y="1458515"/>
+            <a:ext cx="4295788" cy="3136107"/>
           </a:xfrm>
         </p:spPr>
         <p:txBody>
@@ -2318,7 +1967,7 @@
           <a:p>
             <a:fld id="{241EB5C9-1307-BA42-ABA2-0BC069CD8E7F}" type="datetimeFigureOut">
               <a:rPr lang="en-US" smtClean="0"/>
-              <a:t>7/1/2024</a:t>
+              <a:t>11/21/2025</a:t>
             </a:fld>
             <a:endParaRPr lang="en-US"/>
           </a:p>
@@ -2345,7 +1994,13 @@
       </p:sp>
       <p:sp>
         <p:nvSpPr>
-          <p:cNvPr id="9" name="Slide Number Placeholder 8"/>
+          <p:cNvPr id="12" name="Slide Number Placeholder 5">
+            <a:extLst>
+              <a:ext uri="{FF2B5EF4-FFF2-40B4-BE49-F238E27FC236}">
+                <a16:creationId xmlns:a16="http://schemas.microsoft.com/office/drawing/2014/main" id="{2CB0FB16-3994-A968-CB57-9C765B86AC5B}"/>
+              </a:ext>
+            </a:extLst>
+          </p:cNvPr>
           <p:cNvSpPr>
             <a:spLocks noGrp="1"/>
           </p:cNvSpPr>
@@ -2353,7 +2008,12 @@
             <p:ph type="sldNum" sz="quarter" idx="12"/>
           </p:nvPr>
         </p:nvSpPr>
-        <p:spPr/>
+        <p:spPr>
+          <a:xfrm>
+            <a:off x="6553200" y="4767263"/>
+            <a:ext cx="1416996" cy="273844"/>
+          </a:xfrm>
+        </p:spPr>
         <p:txBody>
           <a:bodyPr/>
           <a:lstStyle/>
@@ -2366,6 +2026,47 @@
           </a:p>
         </p:txBody>
       </p:sp>
+      <p:pic>
+        <p:nvPicPr>
+          <p:cNvPr id="17" name="Graphic 16" descr="Jean Golding Institute, University of Bristol">
+            <a:extLst>
+              <a:ext uri="{FF2B5EF4-FFF2-40B4-BE49-F238E27FC236}">
+                <a16:creationId xmlns:a16="http://schemas.microsoft.com/office/drawing/2014/main" id="{EBC68888-2F06-69F1-5C29-75491D45E1CB}"/>
+              </a:ext>
+              <a:ext uri="{C183D7F6-B498-43B3-948B-1728B52AA6E4}">
+                <adec:decorative xmlns:adec="http://schemas.microsoft.com/office/drawing/2017/decorative" val="0"/>
+              </a:ext>
+            </a:extLst>
+          </p:cNvPr>
+          <p:cNvPicPr>
+            <a:picLocks noChangeAspect="1"/>
+          </p:cNvPicPr>
+          <p:nvPr userDrawn="1"/>
+        </p:nvPicPr>
+        <p:blipFill>
+          <a:blip r:embed="rId2" cstate="screen">
+            <a:extLst>
+              <a:ext uri="{28A0092B-C50C-407E-A947-70E740481C1C}">
+                <a14:useLocalDpi xmlns:a14="http://schemas.microsoft.com/office/drawing/2010/main"/>
+              </a:ext>
+              <a:ext uri="{96DAC541-7B7A-43D3-8B79-37D633B846F1}">
+                <asvg:svgBlip xmlns:asvg="http://schemas.microsoft.com/office/drawing/2016/SVG/main" r:embed="rId3"/>
+              </a:ext>
+            </a:extLst>
+          </a:blip>
+          <a:srcRect/>
+          <a:stretch/>
+        </p:blipFill>
+        <p:spPr>
+          <a:xfrm>
+            <a:off x="8054502" y="4636036"/>
+            <a:ext cx="975121" cy="403313"/>
+          </a:xfrm>
+          <a:prstGeom prst="rect">
+            <a:avLst/>
+          </a:prstGeom>
+        </p:spPr>
+      </p:pic>
     </p:spTree>
     <p:extLst>
       <p:ext uri="{BB962C8B-B14F-4D97-AF65-F5344CB8AC3E}">
@@ -2398,146 +2099,6 @@
       </p:grpSpPr>
       <p:sp>
         <p:nvSpPr>
-          <p:cNvPr id="8" name="Freeform 9">
-            <a:extLst>
-              <a:ext uri="{FF2B5EF4-FFF2-40B4-BE49-F238E27FC236}">
-                <a16:creationId xmlns:a16="http://schemas.microsoft.com/office/drawing/2014/main" id="{1A709076-DE9B-20FB-F39D-1C2476D6CC5A}"/>
-              </a:ext>
-              <a:ext uri="{C183D7F6-B498-43B3-948B-1728B52AA6E4}">
-                <adec:decorative xmlns:adec="http://schemas.microsoft.com/office/drawing/2017/decorative" val="1"/>
-              </a:ext>
-            </a:extLst>
-          </p:cNvPr>
-          <p:cNvSpPr/>
-          <p:nvPr userDrawn="1"/>
-        </p:nvSpPr>
-        <p:spPr>
-          <a:xfrm>
-            <a:off x="-9236" y="0"/>
-            <a:ext cx="6031345" cy="1006763"/>
-          </a:xfrm>
-          <a:custGeom>
-            <a:avLst/>
-            <a:gdLst>
-              <a:gd name="connsiteX0" fmla="*/ 9236 w 6031345"/>
-              <a:gd name="connsiteY0" fmla="*/ 0 h 1006763"/>
-              <a:gd name="connsiteX1" fmla="*/ 6031345 w 6031345"/>
-              <a:gd name="connsiteY1" fmla="*/ 0 h 1006763"/>
-              <a:gd name="connsiteX2" fmla="*/ 5800436 w 6031345"/>
-              <a:gd name="connsiteY2" fmla="*/ 1006763 h 1006763"/>
-              <a:gd name="connsiteX3" fmla="*/ 0 w 6031345"/>
-              <a:gd name="connsiteY3" fmla="*/ 1006763 h 1006763"/>
-              <a:gd name="connsiteX4" fmla="*/ 9236 w 6031345"/>
-              <a:gd name="connsiteY4" fmla="*/ 0 h 1006763"/>
-            </a:gdLst>
-            <a:ahLst/>
-            <a:cxnLst>
-              <a:cxn ang="0">
-                <a:pos x="connsiteX0" y="connsiteY0"/>
-              </a:cxn>
-              <a:cxn ang="0">
-                <a:pos x="connsiteX1" y="connsiteY1"/>
-              </a:cxn>
-              <a:cxn ang="0">
-                <a:pos x="connsiteX2" y="connsiteY2"/>
-              </a:cxn>
-              <a:cxn ang="0">
-                <a:pos x="connsiteX3" y="connsiteY3"/>
-              </a:cxn>
-              <a:cxn ang="0">
-                <a:pos x="connsiteX4" y="connsiteY4"/>
-              </a:cxn>
-            </a:cxnLst>
-            <a:rect l="l" t="t" r="r" b="b"/>
-            <a:pathLst>
-              <a:path w="6031345" h="1006763">
-                <a:moveTo>
-                  <a:pt x="9236" y="0"/>
-                </a:moveTo>
-                <a:lnTo>
-                  <a:pt x="6031345" y="0"/>
-                </a:lnTo>
-                <a:lnTo>
-                  <a:pt x="5800436" y="1006763"/>
-                </a:lnTo>
-                <a:lnTo>
-                  <a:pt x="0" y="1006763"/>
-                </a:lnTo>
-                <a:cubicBezTo>
-                  <a:pt x="3079" y="671175"/>
-                  <a:pt x="6157" y="335588"/>
-                  <a:pt x="9236" y="0"/>
-                </a:cubicBezTo>
-                <a:close/>
-              </a:path>
-            </a:pathLst>
-          </a:custGeom>
-          <a:solidFill>
-            <a:srgbClr val="E1239A"/>
-          </a:solidFill>
-          <a:ln>
-            <a:noFill/>
-          </a:ln>
-        </p:spPr>
-        <p:style>
-          <a:lnRef idx="2">
-            <a:schemeClr val="accent1">
-              <a:shade val="50000"/>
-            </a:schemeClr>
-          </a:lnRef>
-          <a:fillRef idx="1">
-            <a:schemeClr val="accent1"/>
-          </a:fillRef>
-          <a:effectRef idx="0">
-            <a:schemeClr val="accent1"/>
-          </a:effectRef>
-          <a:fontRef idx="minor">
-            <a:schemeClr val="lt1"/>
-          </a:fontRef>
-        </p:style>
-        <p:txBody>
-          <a:bodyPr rtlCol="0" anchor="ctr"/>
-          <a:lstStyle/>
-          <a:p>
-            <a:pPr algn="ctr"/>
-            <a:endParaRPr lang="en-US"/>
-          </a:p>
-        </p:txBody>
-      </p:sp>
-      <p:pic>
-        <p:nvPicPr>
-          <p:cNvPr id="9" name="Picture 8">
-            <a:extLst>
-              <a:ext uri="{FF2B5EF4-FFF2-40B4-BE49-F238E27FC236}">
-                <a16:creationId xmlns:a16="http://schemas.microsoft.com/office/drawing/2014/main" id="{7CB2B103-2604-6188-01E6-1F019BBB6224}"/>
-              </a:ext>
-              <a:ext uri="{C183D7F6-B498-43B3-948B-1728B52AA6E4}">
-                <adec:decorative xmlns:adec="http://schemas.microsoft.com/office/drawing/2017/decorative" val="1"/>
-              </a:ext>
-            </a:extLst>
-          </p:cNvPr>
-          <p:cNvPicPr>
-            <a:picLocks noChangeAspect="1"/>
-          </p:cNvPicPr>
-          <p:nvPr userDrawn="1"/>
-        </p:nvPicPr>
-        <p:blipFill>
-          <a:blip r:embed="rId2"/>
-          <a:srcRect/>
-          <a:stretch/>
-        </p:blipFill>
-        <p:spPr>
-          <a:xfrm>
-            <a:off x="7830787" y="261"/>
-            <a:ext cx="1257270" cy="1269477"/>
-          </a:xfrm>
-          <a:prstGeom prst="rect">
-            <a:avLst/>
-          </a:prstGeom>
-        </p:spPr>
-      </p:pic>
-      <p:sp>
-        <p:nvSpPr>
           <p:cNvPr id="2" name="Title 1"/>
           <p:cNvSpPr>
             <a:spLocks noGrp="1"/>
@@ -2560,7 +2121,7 @@
             <a:lvl1pPr algn="l">
               <a:defRPr sz="2800" b="0">
                 <a:solidFill>
-                  <a:schemeClr val="bg1"/>
+                  <a:schemeClr val="accent6"/>
                 </a:solidFill>
               </a:defRPr>
             </a:lvl1pPr>
@@ -2585,8 +2146,8 @@
         </p:nvSpPr>
         <p:spPr>
           <a:xfrm>
-            <a:off x="3575049" y="1212742"/>
-            <a:ext cx="5367349" cy="3381881"/>
+            <a:off x="3575049" y="959796"/>
+            <a:ext cx="5367349" cy="3634827"/>
           </a:xfrm>
         </p:spPr>
         <p:txBody>
@@ -2669,8 +2230,8 @@
         </p:nvSpPr>
         <p:spPr>
           <a:xfrm>
-            <a:off x="201601" y="1212742"/>
-            <a:ext cx="3263914" cy="3381881"/>
+            <a:off x="201601" y="959796"/>
+            <a:ext cx="3263914" cy="3634827"/>
           </a:xfrm>
         </p:spPr>
         <p:txBody>
@@ -2741,7 +2302,7 @@
           <a:p>
             <a:fld id="{241EB5C9-1307-BA42-ABA2-0BC069CD8E7F}" type="datetimeFigureOut">
               <a:rPr lang="en-US" smtClean="0"/>
-              <a:t>7/1/2024</a:t>
+              <a:t>11/21/2025</a:t>
             </a:fld>
             <a:endParaRPr lang="en-US"/>
           </a:p>
@@ -2768,7 +2329,13 @@
       </p:sp>
       <p:sp>
         <p:nvSpPr>
-          <p:cNvPr id="7" name="Slide Number Placeholder 6"/>
+          <p:cNvPr id="10" name="Slide Number Placeholder 5">
+            <a:extLst>
+              <a:ext uri="{FF2B5EF4-FFF2-40B4-BE49-F238E27FC236}">
+                <a16:creationId xmlns:a16="http://schemas.microsoft.com/office/drawing/2014/main" id="{002267A7-CC34-7482-C744-2AB8C2C4E8ED}"/>
+              </a:ext>
+            </a:extLst>
+          </p:cNvPr>
           <p:cNvSpPr>
             <a:spLocks noGrp="1"/>
           </p:cNvSpPr>
@@ -2776,7 +2343,12 @@
             <p:ph type="sldNum" sz="quarter" idx="12"/>
           </p:nvPr>
         </p:nvSpPr>
-        <p:spPr/>
+        <p:spPr>
+          <a:xfrm>
+            <a:off x="6553200" y="4767263"/>
+            <a:ext cx="1416996" cy="273844"/>
+          </a:xfrm>
+        </p:spPr>
         <p:txBody>
           <a:bodyPr/>
           <a:lstStyle/>
@@ -2789,6 +2361,47 @@
           </a:p>
         </p:txBody>
       </p:sp>
+      <p:pic>
+        <p:nvPicPr>
+          <p:cNvPr id="14" name="Graphic 13" descr="Jean Golding Institute, University of Bristol">
+            <a:extLst>
+              <a:ext uri="{FF2B5EF4-FFF2-40B4-BE49-F238E27FC236}">
+                <a16:creationId xmlns:a16="http://schemas.microsoft.com/office/drawing/2014/main" id="{2E2B4D5F-FC26-40C1-273C-8A4B81A04931}"/>
+              </a:ext>
+              <a:ext uri="{C183D7F6-B498-43B3-948B-1728B52AA6E4}">
+                <adec:decorative xmlns:adec="http://schemas.microsoft.com/office/drawing/2017/decorative" val="0"/>
+              </a:ext>
+            </a:extLst>
+          </p:cNvPr>
+          <p:cNvPicPr>
+            <a:picLocks noChangeAspect="1"/>
+          </p:cNvPicPr>
+          <p:nvPr userDrawn="1"/>
+        </p:nvPicPr>
+        <p:blipFill>
+          <a:blip r:embed="rId2" cstate="screen">
+            <a:extLst>
+              <a:ext uri="{28A0092B-C50C-407E-A947-70E740481C1C}">
+                <a14:useLocalDpi xmlns:a14="http://schemas.microsoft.com/office/drawing/2010/main"/>
+              </a:ext>
+              <a:ext uri="{96DAC541-7B7A-43D3-8B79-37D633B846F1}">
+                <asvg:svgBlip xmlns:asvg="http://schemas.microsoft.com/office/drawing/2016/SVG/main" r:embed="rId3"/>
+              </a:ext>
+            </a:extLst>
+          </a:blip>
+          <a:srcRect/>
+          <a:stretch/>
+        </p:blipFill>
+        <p:spPr>
+          <a:xfrm>
+            <a:off x="8054502" y="4636036"/>
+            <a:ext cx="975121" cy="403313"/>
+          </a:xfrm>
+          <a:prstGeom prst="rect">
+            <a:avLst/>
+          </a:prstGeom>
+        </p:spPr>
+      </p:pic>
     </p:spTree>
     <p:extLst>
       <p:ext uri="{BB962C8B-B14F-4D97-AF65-F5344CB8AC3E}">
@@ -2821,121 +2434,119 @@
       </p:grpSpPr>
       <p:sp>
         <p:nvSpPr>
-          <p:cNvPr id="6" name="Freeform 9">
+          <p:cNvPr id="2" name="Title 1"/>
+          <p:cNvSpPr>
+            <a:spLocks noGrp="1"/>
+          </p:cNvSpPr>
+          <p:nvPr>
+            <p:ph type="title"/>
+          </p:nvPr>
+        </p:nvSpPr>
+        <p:spPr/>
+        <p:txBody>
+          <a:bodyPr/>
+          <a:lstStyle>
+            <a:lvl1pPr>
+              <a:defRPr>
+                <a:solidFill>
+                  <a:schemeClr val="accent6"/>
+                </a:solidFill>
+              </a:defRPr>
+            </a:lvl1pPr>
+          </a:lstStyle>
+          <a:p>
+            <a:r>
+              <a:rPr lang="en-US"/>
+              <a:t>Click to edit Master title style</a:t>
+            </a:r>
+          </a:p>
+        </p:txBody>
+      </p:sp>
+      <p:sp>
+        <p:nvSpPr>
+          <p:cNvPr id="3" name="Date Placeholder 2"/>
+          <p:cNvSpPr>
+            <a:spLocks noGrp="1"/>
+          </p:cNvSpPr>
+          <p:nvPr>
+            <p:ph type="dt" sz="half" idx="10"/>
+          </p:nvPr>
+        </p:nvSpPr>
+        <p:spPr/>
+        <p:txBody>
+          <a:bodyPr/>
+          <a:lstStyle/>
+          <a:p>
+            <a:fld id="{241EB5C9-1307-BA42-ABA2-0BC069CD8E7F}" type="datetimeFigureOut">
+              <a:rPr lang="en-US" smtClean="0"/>
+              <a:t>11/21/2025</a:t>
+            </a:fld>
+            <a:endParaRPr lang="en-US"/>
+          </a:p>
+        </p:txBody>
+      </p:sp>
+      <p:sp>
+        <p:nvSpPr>
+          <p:cNvPr id="4" name="Footer Placeholder 3"/>
+          <p:cNvSpPr>
+            <a:spLocks noGrp="1"/>
+          </p:cNvSpPr>
+          <p:nvPr>
+            <p:ph type="ftr" sz="quarter" idx="11"/>
+          </p:nvPr>
+        </p:nvSpPr>
+        <p:spPr/>
+        <p:txBody>
+          <a:bodyPr/>
+          <a:lstStyle/>
+          <a:p>
+            <a:endParaRPr lang="en-US"/>
+          </a:p>
+        </p:txBody>
+      </p:sp>
+      <p:sp>
+        <p:nvSpPr>
+          <p:cNvPr id="8" name="Slide Number Placeholder 5">
             <a:extLst>
               <a:ext uri="{FF2B5EF4-FFF2-40B4-BE49-F238E27FC236}">
-                <a16:creationId xmlns:a16="http://schemas.microsoft.com/office/drawing/2014/main" id="{4EAFBC31-AA9D-BD30-C765-E0125AE4C4CA}"/>
-              </a:ext>
-              <a:ext uri="{C183D7F6-B498-43B3-948B-1728B52AA6E4}">
-                <adec:decorative xmlns:adec="http://schemas.microsoft.com/office/drawing/2017/decorative" val="1"/>
+                <a16:creationId xmlns:a16="http://schemas.microsoft.com/office/drawing/2014/main" id="{3EC19EDE-155E-753A-195E-83B32E556AC6}"/>
               </a:ext>
             </a:extLst>
           </p:cNvPr>
-          <p:cNvSpPr/>
-          <p:nvPr userDrawn="1"/>
-        </p:nvSpPr>
-        <p:spPr>
-          <a:xfrm>
-            <a:off x="-9236" y="0"/>
-            <a:ext cx="6031345" cy="1006763"/>
-          </a:xfrm>
-          <a:custGeom>
-            <a:avLst/>
-            <a:gdLst>
-              <a:gd name="connsiteX0" fmla="*/ 9236 w 6031345"/>
-              <a:gd name="connsiteY0" fmla="*/ 0 h 1006763"/>
-              <a:gd name="connsiteX1" fmla="*/ 6031345 w 6031345"/>
-              <a:gd name="connsiteY1" fmla="*/ 0 h 1006763"/>
-              <a:gd name="connsiteX2" fmla="*/ 5800436 w 6031345"/>
-              <a:gd name="connsiteY2" fmla="*/ 1006763 h 1006763"/>
-              <a:gd name="connsiteX3" fmla="*/ 0 w 6031345"/>
-              <a:gd name="connsiteY3" fmla="*/ 1006763 h 1006763"/>
-              <a:gd name="connsiteX4" fmla="*/ 9236 w 6031345"/>
-              <a:gd name="connsiteY4" fmla="*/ 0 h 1006763"/>
-            </a:gdLst>
-            <a:ahLst/>
-            <a:cxnLst>
-              <a:cxn ang="0">
-                <a:pos x="connsiteX0" y="connsiteY0"/>
-              </a:cxn>
-              <a:cxn ang="0">
-                <a:pos x="connsiteX1" y="connsiteY1"/>
-              </a:cxn>
-              <a:cxn ang="0">
-                <a:pos x="connsiteX2" y="connsiteY2"/>
-              </a:cxn>
-              <a:cxn ang="0">
-                <a:pos x="connsiteX3" y="connsiteY3"/>
-              </a:cxn>
-              <a:cxn ang="0">
-                <a:pos x="connsiteX4" y="connsiteY4"/>
-              </a:cxn>
-            </a:cxnLst>
-            <a:rect l="l" t="t" r="r" b="b"/>
-            <a:pathLst>
-              <a:path w="6031345" h="1006763">
-                <a:moveTo>
-                  <a:pt x="9236" y="0"/>
-                </a:moveTo>
-                <a:lnTo>
-                  <a:pt x="6031345" y="0"/>
-                </a:lnTo>
-                <a:lnTo>
-                  <a:pt x="5800436" y="1006763"/>
-                </a:lnTo>
-                <a:lnTo>
-                  <a:pt x="0" y="1006763"/>
-                </a:lnTo>
-                <a:cubicBezTo>
-                  <a:pt x="3079" y="671175"/>
-                  <a:pt x="6157" y="335588"/>
-                  <a:pt x="9236" y="0"/>
-                </a:cubicBezTo>
-                <a:close/>
-              </a:path>
-            </a:pathLst>
-          </a:custGeom>
-          <a:solidFill>
-            <a:srgbClr val="E1239A"/>
-          </a:solidFill>
-          <a:ln>
-            <a:noFill/>
-          </a:ln>
-        </p:spPr>
-        <p:style>
-          <a:lnRef idx="2">
-            <a:schemeClr val="accent1">
-              <a:shade val="50000"/>
-            </a:schemeClr>
-          </a:lnRef>
-          <a:fillRef idx="1">
-            <a:schemeClr val="accent1"/>
-          </a:fillRef>
-          <a:effectRef idx="0">
-            <a:schemeClr val="accent1"/>
-          </a:effectRef>
-          <a:fontRef idx="minor">
-            <a:schemeClr val="lt1"/>
-          </a:fontRef>
-        </p:style>
-        <p:txBody>
-          <a:bodyPr rtlCol="0" anchor="ctr"/>
+          <p:cNvSpPr>
+            <a:spLocks noGrp="1"/>
+          </p:cNvSpPr>
+          <p:nvPr>
+            <p:ph type="sldNum" sz="quarter" idx="12"/>
+          </p:nvPr>
+        </p:nvSpPr>
+        <p:spPr>
+          <a:xfrm>
+            <a:off x="6553200" y="4767263"/>
+            <a:ext cx="1416996" cy="273844"/>
+          </a:xfrm>
+        </p:spPr>
+        <p:txBody>
+          <a:bodyPr/>
           <a:lstStyle/>
           <a:p>
-            <a:pPr algn="ctr"/>
+            <a:fld id="{C5EF2332-01BF-834F-8236-50238282D533}" type="slidenum">
+              <a:rPr lang="en-US" smtClean="0"/>
+              <a:t>‹#›</a:t>
+            </a:fld>
             <a:endParaRPr lang="en-US"/>
           </a:p>
         </p:txBody>
       </p:sp>
       <p:pic>
         <p:nvPicPr>
-          <p:cNvPr id="7" name="Picture 6">
+          <p:cNvPr id="10" name="Graphic 9" descr="Jean Golding Institute, University of Bristol">
             <a:extLst>
               <a:ext uri="{FF2B5EF4-FFF2-40B4-BE49-F238E27FC236}">
-                <a16:creationId xmlns:a16="http://schemas.microsoft.com/office/drawing/2014/main" id="{233CE57B-D002-96FA-12E0-2D458286118F}"/>
+                <a16:creationId xmlns:a16="http://schemas.microsoft.com/office/drawing/2014/main" id="{6C205319-7447-3760-7C6B-45A03090BADB}"/>
               </a:ext>
               <a:ext uri="{C183D7F6-B498-43B3-948B-1728B52AA6E4}">
-                <adec:decorative xmlns:adec="http://schemas.microsoft.com/office/drawing/2017/decorative" val="1"/>
+                <adec:decorative xmlns:adec="http://schemas.microsoft.com/office/drawing/2017/decorative" val="0"/>
               </a:ext>
             </a:extLst>
           </p:cNvPr>
@@ -2945,115 +2556,29 @@
           <p:nvPr userDrawn="1"/>
         </p:nvPicPr>
         <p:blipFill>
-          <a:blip r:embed="rId2"/>
+          <a:blip r:embed="rId2" cstate="screen">
+            <a:extLst>
+              <a:ext uri="{28A0092B-C50C-407E-A947-70E740481C1C}">
+                <a14:useLocalDpi xmlns:a14="http://schemas.microsoft.com/office/drawing/2010/main"/>
+              </a:ext>
+              <a:ext uri="{96DAC541-7B7A-43D3-8B79-37D633B846F1}">
+                <asvg:svgBlip xmlns:asvg="http://schemas.microsoft.com/office/drawing/2016/SVG/main" r:embed="rId3"/>
+              </a:ext>
+            </a:extLst>
+          </a:blip>
           <a:srcRect/>
           <a:stretch/>
         </p:blipFill>
         <p:spPr>
           <a:xfrm>
-            <a:off x="7830787" y="261"/>
-            <a:ext cx="1257270" cy="1269477"/>
+            <a:off x="8054502" y="4636036"/>
+            <a:ext cx="975121" cy="403313"/>
           </a:xfrm>
           <a:prstGeom prst="rect">
             <a:avLst/>
           </a:prstGeom>
         </p:spPr>
       </p:pic>
-      <p:sp>
-        <p:nvSpPr>
-          <p:cNvPr id="2" name="Title 1"/>
-          <p:cNvSpPr>
-            <a:spLocks noGrp="1"/>
-          </p:cNvSpPr>
-          <p:nvPr>
-            <p:ph type="title"/>
-          </p:nvPr>
-        </p:nvSpPr>
-        <p:spPr/>
-        <p:txBody>
-          <a:bodyPr/>
-          <a:lstStyle>
-            <a:lvl1pPr>
-              <a:defRPr>
-                <a:solidFill>
-                  <a:schemeClr val="bg1"/>
-                </a:solidFill>
-              </a:defRPr>
-            </a:lvl1pPr>
-          </a:lstStyle>
-          <a:p>
-            <a:r>
-              <a:rPr lang="en-US"/>
-              <a:t>Click to edit Master title style</a:t>
-            </a:r>
-          </a:p>
-        </p:txBody>
-      </p:sp>
-      <p:sp>
-        <p:nvSpPr>
-          <p:cNvPr id="3" name="Date Placeholder 2"/>
-          <p:cNvSpPr>
-            <a:spLocks noGrp="1"/>
-          </p:cNvSpPr>
-          <p:nvPr>
-            <p:ph type="dt" sz="half" idx="10"/>
-          </p:nvPr>
-        </p:nvSpPr>
-        <p:spPr/>
-        <p:txBody>
-          <a:bodyPr/>
-          <a:lstStyle/>
-          <a:p>
-            <a:fld id="{241EB5C9-1307-BA42-ABA2-0BC069CD8E7F}" type="datetimeFigureOut">
-              <a:rPr lang="en-US" smtClean="0"/>
-              <a:t>7/1/2024</a:t>
-            </a:fld>
-            <a:endParaRPr lang="en-US"/>
-          </a:p>
-        </p:txBody>
-      </p:sp>
-      <p:sp>
-        <p:nvSpPr>
-          <p:cNvPr id="4" name="Footer Placeholder 3"/>
-          <p:cNvSpPr>
-            <a:spLocks noGrp="1"/>
-          </p:cNvSpPr>
-          <p:nvPr>
-            <p:ph type="ftr" sz="quarter" idx="11"/>
-          </p:nvPr>
-        </p:nvSpPr>
-        <p:spPr/>
-        <p:txBody>
-          <a:bodyPr/>
-          <a:lstStyle/>
-          <a:p>
-            <a:endParaRPr lang="en-US"/>
-          </a:p>
-        </p:txBody>
-      </p:sp>
-      <p:sp>
-        <p:nvSpPr>
-          <p:cNvPr id="5" name="Slide Number Placeholder 4"/>
-          <p:cNvSpPr>
-            <a:spLocks noGrp="1"/>
-          </p:cNvSpPr>
-          <p:nvPr>
-            <p:ph type="sldNum" sz="quarter" idx="12"/>
-          </p:nvPr>
-        </p:nvSpPr>
-        <p:spPr/>
-        <p:txBody>
-          <a:bodyPr/>
-          <a:lstStyle/>
-          <a:p>
-            <a:fld id="{C5EF2332-01BF-834F-8236-50238282D533}" type="slidenum">
-              <a:rPr lang="en-US" smtClean="0"/>
-              <a:t>‹#›</a:t>
-            </a:fld>
-            <a:endParaRPr lang="en-US"/>
-          </a:p>
-        </p:txBody>
-      </p:sp>
     </p:spTree>
     <p:extLst>
       <p:ext uri="{BB962C8B-B14F-4D97-AF65-F5344CB8AC3E}">
@@ -3084,71 +2609,6 @@
           <a:chExt cx="0" cy="0"/>
         </a:xfrm>
       </p:grpSpPr>
-      <p:sp>
-        <p:nvSpPr>
-          <p:cNvPr id="2" name="Date Placeholder 1"/>
-          <p:cNvSpPr>
-            <a:spLocks noGrp="1"/>
-          </p:cNvSpPr>
-          <p:nvPr>
-            <p:ph type="dt" sz="half" idx="10"/>
-          </p:nvPr>
-        </p:nvSpPr>
-        <p:spPr/>
-        <p:txBody>
-          <a:bodyPr/>
-          <a:lstStyle/>
-          <a:p>
-            <a:fld id="{241EB5C9-1307-BA42-ABA2-0BC069CD8E7F}" type="datetimeFigureOut">
-              <a:rPr lang="en-US" smtClean="0"/>
-              <a:t>7/1/2024</a:t>
-            </a:fld>
-            <a:endParaRPr lang="en-US"/>
-          </a:p>
-        </p:txBody>
-      </p:sp>
-      <p:sp>
-        <p:nvSpPr>
-          <p:cNvPr id="3" name="Footer Placeholder 2"/>
-          <p:cNvSpPr>
-            <a:spLocks noGrp="1"/>
-          </p:cNvSpPr>
-          <p:nvPr>
-            <p:ph type="ftr" sz="quarter" idx="11"/>
-          </p:nvPr>
-        </p:nvSpPr>
-        <p:spPr/>
-        <p:txBody>
-          <a:bodyPr/>
-          <a:lstStyle/>
-          <a:p>
-            <a:endParaRPr lang="en-US"/>
-          </a:p>
-        </p:txBody>
-      </p:sp>
-      <p:sp>
-        <p:nvSpPr>
-          <p:cNvPr id="4" name="Slide Number Placeholder 3"/>
-          <p:cNvSpPr>
-            <a:spLocks noGrp="1"/>
-          </p:cNvSpPr>
-          <p:nvPr>
-            <p:ph type="sldNum" sz="quarter" idx="12"/>
-          </p:nvPr>
-        </p:nvSpPr>
-        <p:spPr/>
-        <p:txBody>
-          <a:bodyPr/>
-          <a:lstStyle/>
-          <a:p>
-            <a:fld id="{C5EF2332-01BF-834F-8236-50238282D533}" type="slidenum">
-              <a:rPr lang="en-US" smtClean="0"/>
-              <a:t>‹#›</a:t>
-            </a:fld>
-            <a:endParaRPr lang="en-US"/>
-          </a:p>
-        </p:txBody>
-      </p:sp>
     </p:spTree>
     <p:extLst>
       <p:ext uri="{BB962C8B-B14F-4D97-AF65-F5344CB8AC3E}">
@@ -3510,7 +2970,7 @@
           <a:p>
             <a:fld id="{241EB5C9-1307-BA42-ABA2-0BC069CD8E7F}" type="datetimeFigureOut">
               <a:rPr lang="en-US" smtClean="0"/>
-              <a:t>7/1/2024</a:t>
+              <a:t>11/21/2025</a:t>
             </a:fld>
             <a:endParaRPr lang="en-US"/>
           </a:p>
@@ -3621,7 +3081,7 @@
         <a:buNone/>
         <a:defRPr sz="2800" kern="1200">
           <a:solidFill>
-            <a:schemeClr val="tx1"/>
+            <a:schemeClr val="accent6"/>
           </a:solidFill>
           <a:latin typeface="+mj-lt"/>
           <a:ea typeface="+mj-ea"/>
@@ -3892,15 +3352,21 @@
             <p:ph type="ctrTitle"/>
           </p:nvPr>
         </p:nvSpPr>
-        <p:spPr/>
+        <p:spPr>
+          <a:xfrm>
+            <a:off x="201600" y="1203265"/>
+            <a:ext cx="4675200" cy="1239897"/>
+          </a:xfrm>
+        </p:spPr>
         <p:txBody>
           <a:bodyPr/>
           <a:lstStyle/>
           <a:p>
             <a:r>
-              <a:rPr lang="en-US" dirty="0"/>
+              <a:rPr lang="en-US"/>
               <a:t>Presentation Title</a:t>
             </a:r>
+            <a:endParaRPr lang="en-US" dirty="0"/>
           </a:p>
         </p:txBody>
       </p:sp>
@@ -3914,15 +3380,21 @@
             <p:ph type="subTitle" idx="1"/>
           </p:nvPr>
         </p:nvSpPr>
-        <p:spPr/>
+        <p:spPr>
+          <a:xfrm>
+            <a:off x="201600" y="2464862"/>
+            <a:ext cx="4476726" cy="693211"/>
+          </a:xfrm>
+        </p:spPr>
         <p:txBody>
           <a:bodyPr/>
           <a:lstStyle/>
           <a:p>
             <a:r>
-              <a:rPr lang="en-US" dirty="0"/>
+              <a:rPr lang="en-US"/>
               <a:t>Presentation Subtitle</a:t>
             </a:r>
+            <a:endParaRPr lang="en-US" dirty="0"/>
           </a:p>
         </p:txBody>
       </p:sp>
@@ -3966,15 +3438,21 @@
             <p:ph type="title"/>
           </p:nvPr>
         </p:nvSpPr>
-        <p:spPr/>
+        <p:spPr>
+          <a:xfrm>
+            <a:off x="201600" y="205979"/>
+            <a:ext cx="5580000" cy="623085"/>
+          </a:xfrm>
+        </p:spPr>
         <p:txBody>
           <a:bodyPr/>
           <a:lstStyle/>
           <a:p>
             <a:r>
-              <a:rPr lang="en-US" dirty="0"/>
+              <a:rPr lang="en-US"/>
               <a:t>Slide Title</a:t>
             </a:r>
+            <a:endParaRPr lang="en-US" dirty="0"/>
           </a:p>
         </p:txBody>
       </p:sp>
@@ -3988,21 +3466,19 @@
             <p:ph idx="1"/>
           </p:nvPr>
         </p:nvSpPr>
-        <p:spPr/>
+        <p:spPr>
+          <a:xfrm>
+            <a:off x="201600" y="959796"/>
+            <a:ext cx="8740800" cy="3619243"/>
+          </a:xfrm>
+        </p:spPr>
         <p:txBody>
           <a:bodyPr/>
           <a:lstStyle/>
           <a:p>
-            <a:pPr marL="0" indent="0">
-              <a:buNone/>
-            </a:pPr>
-            <a:r>
-              <a:rPr lang="en-US" dirty="0"/>
-              <a:t>Hello</a:t>
-            </a:r>
             <a:r>
               <a:rPr lang="en-US"/>
-              <a:t>, world.</a:t>
+              <a:t>Hello, world.</a:t>
             </a:r>
           </a:p>
         </p:txBody>
@@ -4047,21 +3523,33 @@
             <p:ph type="title"/>
           </p:nvPr>
         </p:nvSpPr>
-        <p:spPr/>
+        <p:spPr>
+          <a:xfrm>
+            <a:off x="207113" y="1166923"/>
+            <a:ext cx="5038282" cy="2809654"/>
+          </a:xfrm>
+        </p:spPr>
         <p:txBody>
           <a:bodyPr/>
           <a:lstStyle/>
           <a:p>
             <a:r>
-              <a:rPr lang="en-US" dirty="0"/>
+              <a:rPr lang="en-US"/>
               <a:t>Section header</a:t>
             </a:r>
-          </a:p>
-        </p:txBody>
-      </p:sp>
-      <p:sp>
-        <p:nvSpPr>
-          <p:cNvPr id="3" name="Text Placeholder 2"/>
+            <a:endParaRPr lang="en-US" dirty="0"/>
+          </a:p>
+        </p:txBody>
+      </p:sp>
+      <p:sp>
+        <p:nvSpPr>
+          <p:cNvPr id="7" name="Text Placeholder 6">
+            <a:extLst>
+              <a:ext uri="{FF2B5EF4-FFF2-40B4-BE49-F238E27FC236}">
+                <a16:creationId xmlns:a16="http://schemas.microsoft.com/office/drawing/2014/main" id="{D9B703B5-FBA4-7031-3EAE-C1C2ACC82730}"/>
+              </a:ext>
+            </a:extLst>
+          </p:cNvPr>
           <p:cNvSpPr>
             <a:spLocks noGrp="1"/>
           </p:cNvSpPr>
@@ -4118,15 +3606,21 @@
             <p:ph type="title"/>
           </p:nvPr>
         </p:nvSpPr>
-        <p:spPr/>
+        <p:spPr>
+          <a:xfrm>
+            <a:off x="201600" y="205979"/>
+            <a:ext cx="5580000" cy="623085"/>
+          </a:xfrm>
+        </p:spPr>
         <p:txBody>
           <a:bodyPr/>
           <a:lstStyle/>
           <a:p>
             <a:r>
-              <a:rPr lang="en-US" dirty="0"/>
+              <a:rPr lang="en-US"/>
               <a:t>Slide Title for Two-Content</a:t>
             </a:r>
+            <a:endParaRPr lang="en-US" dirty="0"/>
           </a:p>
         </p:txBody>
       </p:sp>
@@ -4140,27 +3634,24 @@
             <p:ph sz="half" idx="1"/>
           </p:nvPr>
         </p:nvSpPr>
-        <p:spPr/>
+        <p:spPr>
+          <a:xfrm>
+            <a:off x="212411" y="959797"/>
+            <a:ext cx="4283389" cy="3634826"/>
+          </a:xfrm>
+        </p:spPr>
         <p:txBody>
           <a:bodyPr/>
           <a:lstStyle/>
           <a:p>
             <a:r>
-              <a:rPr lang="en-US" dirty="0"/>
-              <a:t>Some content on </a:t>
-            </a:r>
-            <a:r>
               <a:rPr lang="en-US"/>
-              <a:t>the left.</a:t>
-            </a:r>
+              <a:t>Some content on the left.</a:t>
+            </a:r>
+          </a:p>
+          <a:p>
             <a:endParaRPr lang="en-US" dirty="0"/>
           </a:p>
-          <a:p>
-            <a:pPr marL="0" indent="0">
-              <a:buNone/>
-            </a:pPr>
-            <a:endParaRPr lang="en-US" dirty="0"/>
-          </a:p>
         </p:txBody>
       </p:sp>
       <p:sp>
@@ -4173,15 +3664,21 @@
             <p:ph sz="half" idx="2"/>
           </p:nvPr>
         </p:nvSpPr>
-        <p:spPr/>
+        <p:spPr>
+          <a:xfrm>
+            <a:off x="4648200" y="959797"/>
+            <a:ext cx="4294200" cy="3634826"/>
+          </a:xfrm>
+        </p:spPr>
         <p:txBody>
           <a:bodyPr/>
           <a:lstStyle/>
           <a:p>
             <a:r>
-              <a:rPr lang="en-US" dirty="0"/>
+              <a:rPr lang="en-US"/>
               <a:t>Some content on the right.</a:t>
             </a:r>
+            <a:endParaRPr lang="en-US" dirty="0"/>
           </a:p>
         </p:txBody>
       </p:sp>

</xml_diff>